<commit_message>
CTECH 403 JSON module + renumbering
</commit_message>
<xml_diff>
--- a/ctech403/module_1/CTECH403 Module 1 - Files.pptx
+++ b/ctech403/module_1/CTECH403 Module 1 - Files.pptx
@@ -5,7 +5,7 @@
     <p:sldMasterId id="2147483648" r:id="rId1"/>
   </p:sldMasterIdLst>
   <p:notesMasterIdLst>
-    <p:notesMasterId r:id="rId109"/>
+    <p:notesMasterId r:id="rId94"/>
   </p:notesMasterIdLst>
   <p:sldIdLst>
     <p:sldId id="347" r:id="rId2"/>
@@ -100,21 +100,6 @@
     <p:sldId id="404" r:id="rId91"/>
     <p:sldId id="456" r:id="rId92"/>
     <p:sldId id="405" r:id="rId93"/>
-    <p:sldId id="406" r:id="rId94"/>
-    <p:sldId id="407" r:id="rId95"/>
-    <p:sldId id="408" r:id="rId96"/>
-    <p:sldId id="409" r:id="rId97"/>
-    <p:sldId id="410" r:id="rId98"/>
-    <p:sldId id="412" r:id="rId99"/>
-    <p:sldId id="413" r:id="rId100"/>
-    <p:sldId id="411" r:id="rId101"/>
-    <p:sldId id="414" r:id="rId102"/>
-    <p:sldId id="458" r:id="rId103"/>
-    <p:sldId id="459" r:id="rId104"/>
-    <p:sldId id="415" r:id="rId105"/>
-    <p:sldId id="417" r:id="rId106"/>
-    <p:sldId id="416" r:id="rId107"/>
-    <p:sldId id="460" r:id="rId108"/>
   </p:sldIdLst>
   <p:sldSz cx="12192000" cy="6858000"/>
   <p:notesSz cx="6858000" cy="9144000"/>
@@ -314,7 +299,7 @@
           <a:p>
             <a:fld id="{1778ACD8-6E14-F146-9986-2DDB8F18C1FA}" type="datetimeFigureOut">
               <a:rPr lang="en-US" smtClean="0"/>
-              <a:t>4/30/19</a:t>
+              <a:t>5/6/19</a:t>
             </a:fld>
             <a:endParaRPr lang="en-US"/>
           </a:p>
@@ -656,90 +641,6 @@
     <p:extLst>
       <p:ext uri="{BB962C8B-B14F-4D97-AF65-F5344CB8AC3E}">
         <p14:creationId xmlns:p14="http://schemas.microsoft.com/office/powerpoint/2010/main" val="1964822085"/>
-      </p:ext>
-    </p:extLst>
-  </p:cSld>
-  <p:clrMapOvr>
-    <a:masterClrMapping/>
-  </p:clrMapOvr>
-</p:notes>
-</file>
-
-<file path=ppt/notesSlides/notesSlide10.xml><?xml version="1.0" encoding="utf-8"?>
-<p:notes xmlns:a="http://schemas.openxmlformats.org/drawingml/2006/main" xmlns:r="http://schemas.openxmlformats.org/officeDocument/2006/relationships" xmlns:p="http://schemas.openxmlformats.org/presentationml/2006/main">
-  <p:cSld>
-    <p:spTree>
-      <p:nvGrpSpPr>
-        <p:cNvPr id="1" name=""/>
-        <p:cNvGrpSpPr/>
-        <p:nvPr/>
-      </p:nvGrpSpPr>
-      <p:grpSpPr>
-        <a:xfrm>
-          <a:off x="0" y="0"/>
-          <a:ext cx="0" cy="0"/>
-          <a:chOff x="0" y="0"/>
-          <a:chExt cx="0" cy="0"/>
-        </a:xfrm>
-      </p:grpSpPr>
-      <p:sp>
-        <p:nvSpPr>
-          <p:cNvPr id="2" name="Slide Image Placeholder 1"/>
-          <p:cNvSpPr>
-            <a:spLocks noGrp="1" noRot="1" noChangeAspect="1"/>
-          </p:cNvSpPr>
-          <p:nvPr>
-            <p:ph type="sldImg"/>
-          </p:nvPr>
-        </p:nvSpPr>
-        <p:spPr/>
-      </p:sp>
-      <p:sp>
-        <p:nvSpPr>
-          <p:cNvPr id="3" name="Notes Placeholder 2"/>
-          <p:cNvSpPr>
-            <a:spLocks noGrp="1"/>
-          </p:cNvSpPr>
-          <p:nvPr>
-            <p:ph type="body" idx="1"/>
-          </p:nvPr>
-        </p:nvSpPr>
-        <p:spPr/>
-        <p:txBody>
-          <a:bodyPr/>
-          <a:lstStyle/>
-          <a:p>
-            <a:endParaRPr lang="en-US" dirty="0"/>
-          </a:p>
-        </p:txBody>
-      </p:sp>
-      <p:sp>
-        <p:nvSpPr>
-          <p:cNvPr id="4" name="Slide Number Placeholder 3"/>
-          <p:cNvSpPr>
-            <a:spLocks noGrp="1"/>
-          </p:cNvSpPr>
-          <p:nvPr>
-            <p:ph type="sldNum" sz="quarter" idx="10"/>
-          </p:nvPr>
-        </p:nvSpPr>
-        <p:spPr/>
-        <p:txBody>
-          <a:bodyPr/>
-          <a:lstStyle/>
-          <a:p>
-            <a:fld id="{C8B14FCA-A5D1-0749-96A8-1423D61C59E6}" type="slidenum">
-              <a:rPr lang="en-US" smtClean="0"/>
-              <a:t>93</a:t>
-            </a:fld>
-            <a:endParaRPr lang="en-US"/>
-          </a:p>
-        </p:txBody>
-      </p:sp>
-    </p:spTree>
-    <p:extLst>
-      <p:ext uri="{BB962C8B-B14F-4D97-AF65-F5344CB8AC3E}">
-        <p14:creationId xmlns:p14="http://schemas.microsoft.com/office/powerpoint/2010/main" val="2902869038"/>
       </p:ext>
     </p:extLst>
   </p:cSld>
@@ -2854,1514 +2755,6 @@
 </p:sld>
 </file>
 
-<file path=ppt/slides/slide100.xml><?xml version="1.0" encoding="utf-8"?>
-<p:sld xmlns:a="http://schemas.openxmlformats.org/drawingml/2006/main" xmlns:r="http://schemas.openxmlformats.org/officeDocument/2006/relationships" xmlns:p="http://schemas.openxmlformats.org/presentationml/2006/main">
-  <p:cSld>
-    <p:spTree>
-      <p:nvGrpSpPr>
-        <p:cNvPr id="1" name=""/>
-        <p:cNvGrpSpPr/>
-        <p:nvPr/>
-      </p:nvGrpSpPr>
-      <p:grpSpPr>
-        <a:xfrm>
-          <a:off x="0" y="0"/>
-          <a:ext cx="0" cy="0"/>
-          <a:chOff x="0" y="0"/>
-          <a:chExt cx="0" cy="0"/>
-        </a:xfrm>
-      </p:grpSpPr>
-      <p:sp>
-        <p:nvSpPr>
-          <p:cNvPr id="2" name="Content Placeholder 1">
-            <a:extLst>
-              <a:ext uri="{FF2B5EF4-FFF2-40B4-BE49-F238E27FC236}">
-                <a16:creationId xmlns:a16="http://schemas.microsoft.com/office/drawing/2014/main" id="{9D22FCB5-CCE9-994B-BEC9-547A2E3FD142}"/>
-              </a:ext>
-            </a:extLst>
-          </p:cNvPr>
-          <p:cNvSpPr>
-            <a:spLocks noGrp="1"/>
-          </p:cNvSpPr>
-          <p:nvPr>
-            <p:ph sz="quarter" idx="10"/>
-          </p:nvPr>
-        </p:nvSpPr>
-        <p:spPr/>
-        <p:txBody>
-          <a:bodyPr/>
-          <a:lstStyle/>
-          <a:p>
-            <a:r>
-              <a:rPr lang="en-US" dirty="0"/>
-              <a:t>$ python birds1.py</a:t>
-            </a:r>
-          </a:p>
-        </p:txBody>
-      </p:sp>
-    </p:spTree>
-    <p:extLst>
-      <p:ext uri="{BB962C8B-B14F-4D97-AF65-F5344CB8AC3E}">
-        <p14:creationId xmlns:p14="http://schemas.microsoft.com/office/powerpoint/2010/main" val="4276335715"/>
-      </p:ext>
-    </p:extLst>
-  </p:cSld>
-  <p:clrMapOvr>
-    <a:masterClrMapping/>
-  </p:clrMapOvr>
-</p:sld>
-</file>
-
-<file path=ppt/slides/slide101.xml><?xml version="1.0" encoding="utf-8"?>
-<p:sld xmlns:a="http://schemas.openxmlformats.org/drawingml/2006/main" xmlns:r="http://schemas.openxmlformats.org/officeDocument/2006/relationships" xmlns:p="http://schemas.openxmlformats.org/presentationml/2006/main">
-  <p:cSld>
-    <p:spTree>
-      <p:nvGrpSpPr>
-        <p:cNvPr id="1" name=""/>
-        <p:cNvGrpSpPr/>
-        <p:nvPr/>
-      </p:nvGrpSpPr>
-      <p:grpSpPr>
-        <a:xfrm>
-          <a:off x="0" y="0"/>
-          <a:ext cx="0" cy="0"/>
-          <a:chOff x="0" y="0"/>
-          <a:chExt cx="0" cy="0"/>
-        </a:xfrm>
-      </p:grpSpPr>
-      <p:sp>
-        <p:nvSpPr>
-          <p:cNvPr id="2" name="Text Placeholder 1">
-            <a:extLst>
-              <a:ext uri="{FF2B5EF4-FFF2-40B4-BE49-F238E27FC236}">
-                <a16:creationId xmlns:a16="http://schemas.microsoft.com/office/drawing/2014/main" id="{E42F6997-8269-784F-87ED-B03F889DEC0E}"/>
-              </a:ext>
-            </a:extLst>
-          </p:cNvPr>
-          <p:cNvSpPr>
-            <a:spLocks noGrp="1"/>
-          </p:cNvSpPr>
-          <p:nvPr>
-            <p:ph type="body" sz="quarter" idx="10"/>
-          </p:nvPr>
-        </p:nvSpPr>
-        <p:spPr/>
-        <p:txBody>
-          <a:bodyPr/>
-          <a:lstStyle/>
-          <a:p>
-            <a:r>
-              <a:rPr lang="en-US" dirty="0"/>
-              <a:t>What if the file is </a:t>
-            </a:r>
-            <a:r>
-              <a:rPr lang="en-US" i="1" dirty="0"/>
-              <a:t>observations</a:t>
-            </a:r>
-            <a:r>
-              <a:rPr lang="en-US" dirty="0"/>
-              <a:t> of birds, and the same bird can appear more than once?</a:t>
-            </a:r>
-          </a:p>
-        </p:txBody>
-      </p:sp>
-    </p:spTree>
-    <p:extLst>
-      <p:ext uri="{BB962C8B-B14F-4D97-AF65-F5344CB8AC3E}">
-        <p14:creationId xmlns:p14="http://schemas.microsoft.com/office/powerpoint/2010/main" val="3877380291"/>
-      </p:ext>
-    </p:extLst>
-  </p:cSld>
-  <p:clrMapOvr>
-    <a:masterClrMapping/>
-  </p:clrMapOvr>
-</p:sld>
-</file>
-
-<file path=ppt/slides/slide102.xml><?xml version="1.0" encoding="utf-8"?>
-<p:sld xmlns:a="http://schemas.openxmlformats.org/drawingml/2006/main" xmlns:r="http://schemas.openxmlformats.org/officeDocument/2006/relationships" xmlns:p="http://schemas.openxmlformats.org/presentationml/2006/main">
-  <p:cSld>
-    <p:spTree>
-      <p:nvGrpSpPr>
-        <p:cNvPr id="1" name=""/>
-        <p:cNvGrpSpPr/>
-        <p:nvPr/>
-      </p:nvGrpSpPr>
-      <p:grpSpPr>
-        <a:xfrm>
-          <a:off x="0" y="0"/>
-          <a:ext cx="0" cy="0"/>
-          <a:chOff x="0" y="0"/>
-          <a:chExt cx="0" cy="0"/>
-        </a:xfrm>
-      </p:grpSpPr>
-      <p:sp>
-        <p:nvSpPr>
-          <p:cNvPr id="2" name="Text Placeholder 1">
-            <a:extLst>
-              <a:ext uri="{FF2B5EF4-FFF2-40B4-BE49-F238E27FC236}">
-                <a16:creationId xmlns:a16="http://schemas.microsoft.com/office/drawing/2014/main" id="{C88443E6-C573-5B42-935A-5265C158BA1D}"/>
-              </a:ext>
-            </a:extLst>
-          </p:cNvPr>
-          <p:cNvSpPr>
-            <a:spLocks noGrp="1"/>
-          </p:cNvSpPr>
-          <p:nvPr>
-            <p:ph type="body" sz="quarter" idx="11"/>
-          </p:nvPr>
-        </p:nvSpPr>
-        <p:spPr/>
-        <p:txBody>
-          <a:bodyPr/>
-          <a:lstStyle/>
-          <a:p>
-            <a:endParaRPr lang="en-US"/>
-          </a:p>
-        </p:txBody>
-      </p:sp>
-      <p:sp>
-        <p:nvSpPr>
-          <p:cNvPr id="3" name="Text Placeholder 2">
-            <a:extLst>
-              <a:ext uri="{FF2B5EF4-FFF2-40B4-BE49-F238E27FC236}">
-                <a16:creationId xmlns:a16="http://schemas.microsoft.com/office/drawing/2014/main" id="{0113DF52-4BD4-4544-BC4A-8105A42C3F1D}"/>
-              </a:ext>
-            </a:extLst>
-          </p:cNvPr>
-          <p:cNvSpPr>
-            <a:spLocks noGrp="1"/>
-          </p:cNvSpPr>
-          <p:nvPr>
-            <p:ph type="body" sz="quarter" idx="12"/>
-          </p:nvPr>
-        </p:nvSpPr>
-        <p:spPr>
-          <a:xfrm>
-            <a:off x="949123" y="359330"/>
-            <a:ext cx="10955577" cy="7572971"/>
-          </a:xfrm>
-        </p:spPr>
-        <p:txBody>
-          <a:bodyPr/>
-          <a:lstStyle/>
-          <a:p>
-            <a:r>
-              <a:rPr lang="en-US" dirty="0"/>
-              <a:t>sparrow 4</a:t>
-            </a:r>
-          </a:p>
-          <a:p>
-            <a:r>
-              <a:rPr lang="en-US" dirty="0"/>
-              <a:t>canary 4</a:t>
-            </a:r>
-          </a:p>
-          <a:p>
-            <a:r>
-              <a:rPr lang="en-US" dirty="0"/>
-              <a:t>parrot 2</a:t>
-            </a:r>
-          </a:p>
-          <a:p>
-            <a:r>
-              <a:rPr lang="en-US" dirty="0" err="1"/>
-              <a:t>bluejay</a:t>
-            </a:r>
-            <a:r>
-              <a:rPr lang="en-US" dirty="0"/>
-              <a:t> 1</a:t>
-            </a:r>
-          </a:p>
-          <a:p>
-            <a:r>
-              <a:rPr lang="en-US" dirty="0"/>
-              <a:t>macaw 8</a:t>
-            </a:r>
-          </a:p>
-          <a:p>
-            <a:r>
-              <a:rPr lang="en-US" dirty="0"/>
-              <a:t>crow 3</a:t>
-            </a:r>
-          </a:p>
-          <a:p>
-            <a:r>
-              <a:rPr lang="en-US" dirty="0"/>
-              <a:t>robin 1</a:t>
-            </a:r>
-          </a:p>
-          <a:p>
-            <a:r>
-              <a:rPr lang="en-US" dirty="0"/>
-              <a:t>pigeon 30</a:t>
-            </a:r>
-          </a:p>
-          <a:p>
-            <a:r>
-              <a:rPr lang="en-US" dirty="0"/>
-              <a:t>vulture 3</a:t>
-            </a:r>
-          </a:p>
-          <a:p>
-            <a:r>
-              <a:rPr lang="en-US" dirty="0"/>
-              <a:t>eagle 2</a:t>
-            </a:r>
-          </a:p>
-          <a:p>
-            <a:r>
-              <a:rPr lang="en-US" dirty="0"/>
-              <a:t>hawk 6</a:t>
-            </a:r>
-          </a:p>
-          <a:p>
-            <a:r>
-              <a:rPr lang="en-US" dirty="0"/>
-              <a:t>eagle 4</a:t>
-            </a:r>
-          </a:p>
-          <a:p>
-            <a:r>
-              <a:rPr lang="en-US" dirty="0"/>
-              <a:t>crow 1</a:t>
-            </a:r>
-          </a:p>
-          <a:p>
-            <a:r>
-              <a:rPr lang="en-US" dirty="0" err="1"/>
-              <a:t>bluejay</a:t>
-            </a:r>
-            <a:r>
-              <a:rPr lang="en-US" dirty="0"/>
-              <a:t> 3</a:t>
-            </a:r>
-          </a:p>
-          <a:p>
-            <a:r>
-              <a:rPr lang="en-US" dirty="0" err="1"/>
-              <a:t>bluejay</a:t>
-            </a:r>
-            <a:r>
-              <a:rPr lang="en-US" dirty="0"/>
-              <a:t> 4</a:t>
-            </a:r>
-          </a:p>
-          <a:p>
-            <a:r>
-              <a:rPr lang="en-US" dirty="0"/>
-              <a:t>vulture 1</a:t>
-            </a:r>
-          </a:p>
-          <a:p>
-            <a:r>
-              <a:rPr lang="en-US" dirty="0"/>
-              <a:t>pigeon 30</a:t>
-            </a:r>
-          </a:p>
-          <a:p>
-            <a:r>
-              <a:rPr lang="en-US" dirty="0"/>
-              <a:t>robin 1</a:t>
-            </a:r>
-          </a:p>
-        </p:txBody>
-      </p:sp>
-      <p:sp>
-        <p:nvSpPr>
-          <p:cNvPr id="4" name="TextBox 3">
-            <a:extLst>
-              <a:ext uri="{FF2B5EF4-FFF2-40B4-BE49-F238E27FC236}">
-                <a16:creationId xmlns:a16="http://schemas.microsoft.com/office/drawing/2014/main" id="{4439B93F-399C-984D-910B-E4F3C3BDAF91}"/>
-              </a:ext>
-            </a:extLst>
-          </p:cNvPr>
-          <p:cNvSpPr txBox="1"/>
-          <p:nvPr/>
-        </p:nvSpPr>
-        <p:spPr>
-          <a:xfrm>
-            <a:off x="2579427" y="5745707"/>
-            <a:ext cx="2108269" cy="369332"/>
-          </a:xfrm>
-          <a:prstGeom prst="rect">
-            <a:avLst/>
-          </a:prstGeom>
-          <a:noFill/>
-        </p:spPr>
-        <p:txBody>
-          <a:bodyPr wrap="none" rtlCol="0">
-            <a:spAutoFit/>
-          </a:bodyPr>
-          <a:lstStyle/>
-          <a:p>
-            <a:r>
-              <a:rPr lang="en-US" dirty="0"/>
-              <a:t>&lt;birds-</a:t>
-            </a:r>
-            <a:r>
-              <a:rPr lang="en-US" dirty="0" err="1"/>
-              <a:t>repeats.txt</a:t>
-            </a:r>
-            <a:r>
-              <a:rPr lang="en-US" dirty="0"/>
-              <a:t>&gt;</a:t>
-            </a:r>
-          </a:p>
-        </p:txBody>
-      </p:sp>
-    </p:spTree>
-    <p:extLst>
-      <p:ext uri="{BB962C8B-B14F-4D97-AF65-F5344CB8AC3E}">
-        <p14:creationId xmlns:p14="http://schemas.microsoft.com/office/powerpoint/2010/main" val="2889339837"/>
-      </p:ext>
-    </p:extLst>
-  </p:cSld>
-  <p:clrMapOvr>
-    <a:masterClrMapping/>
-  </p:clrMapOvr>
-</p:sld>
-</file>
-
-<file path=ppt/slides/slide103.xml><?xml version="1.0" encoding="utf-8"?>
-<p:sld xmlns:a="http://schemas.openxmlformats.org/drawingml/2006/main" xmlns:r="http://schemas.openxmlformats.org/officeDocument/2006/relationships" xmlns:p="http://schemas.openxmlformats.org/presentationml/2006/main">
-  <p:cSld>
-    <p:spTree>
-      <p:nvGrpSpPr>
-        <p:cNvPr id="1" name=""/>
-        <p:cNvGrpSpPr/>
-        <p:nvPr/>
-      </p:nvGrpSpPr>
-      <p:grpSpPr>
-        <a:xfrm>
-          <a:off x="0" y="0"/>
-          <a:ext cx="0" cy="0"/>
-          <a:chOff x="0" y="0"/>
-          <a:chExt cx="0" cy="0"/>
-        </a:xfrm>
-      </p:grpSpPr>
-      <p:sp>
-        <p:nvSpPr>
-          <p:cNvPr id="2" name="Text Placeholder 1">
-            <a:extLst>
-              <a:ext uri="{FF2B5EF4-FFF2-40B4-BE49-F238E27FC236}">
-                <a16:creationId xmlns:a16="http://schemas.microsoft.com/office/drawing/2014/main" id="{E42F6997-8269-784F-87ED-B03F889DEC0E}"/>
-              </a:ext>
-            </a:extLst>
-          </p:cNvPr>
-          <p:cNvSpPr>
-            <a:spLocks noGrp="1"/>
-          </p:cNvSpPr>
-          <p:nvPr>
-            <p:ph type="body" sz="quarter" idx="10"/>
-          </p:nvPr>
-        </p:nvSpPr>
-        <p:spPr/>
-        <p:txBody>
-          <a:bodyPr/>
-          <a:lstStyle/>
-          <a:p>
-            <a:r>
-              <a:rPr lang="en-US" dirty="0"/>
-              <a:t>Then our current program fails, because if you see 2 eagles and then 4 eagles, the 4 eagles will overwrite the 2 eagles. Wrong!</a:t>
-            </a:r>
-          </a:p>
-          <a:p>
-            <a:r>
-              <a:rPr lang="en-US" dirty="0"/>
-              <a:t>But we can fix this easily.</a:t>
-            </a:r>
-          </a:p>
-        </p:txBody>
-      </p:sp>
-    </p:spTree>
-    <p:extLst>
-      <p:ext uri="{BB962C8B-B14F-4D97-AF65-F5344CB8AC3E}">
-        <p14:creationId xmlns:p14="http://schemas.microsoft.com/office/powerpoint/2010/main" val="1971973561"/>
-      </p:ext>
-    </p:extLst>
-  </p:cSld>
-  <p:clrMapOvr>
-    <a:masterClrMapping/>
-  </p:clrMapOvr>
-</p:sld>
-</file>
-
-<file path=ppt/slides/slide104.xml><?xml version="1.0" encoding="utf-8"?>
-<p:sld xmlns:a="http://schemas.openxmlformats.org/drawingml/2006/main" xmlns:r="http://schemas.openxmlformats.org/officeDocument/2006/relationships" xmlns:p="http://schemas.openxmlformats.org/presentationml/2006/main">
-  <p:cSld>
-    <p:spTree>
-      <p:nvGrpSpPr>
-        <p:cNvPr id="1" name=""/>
-        <p:cNvGrpSpPr/>
-        <p:nvPr/>
-      </p:nvGrpSpPr>
-      <p:grpSpPr>
-        <a:xfrm>
-          <a:off x="0" y="0"/>
-          <a:ext cx="0" cy="0"/>
-          <a:chOff x="0" y="0"/>
-          <a:chExt cx="0" cy="0"/>
-        </a:xfrm>
-      </p:grpSpPr>
-      <p:sp>
-        <p:nvSpPr>
-          <p:cNvPr id="2" name="Text Placeholder 1">
-            <a:extLst>
-              <a:ext uri="{FF2B5EF4-FFF2-40B4-BE49-F238E27FC236}">
-                <a16:creationId xmlns:a16="http://schemas.microsoft.com/office/drawing/2014/main" id="{E2332D5A-B05C-AF4A-AFEC-83DF58EE0691}"/>
-              </a:ext>
-            </a:extLst>
-          </p:cNvPr>
-          <p:cNvSpPr>
-            <a:spLocks noGrp="1"/>
-          </p:cNvSpPr>
-          <p:nvPr>
-            <p:ph type="body" sz="quarter" idx="11"/>
-          </p:nvPr>
-        </p:nvSpPr>
-        <p:spPr/>
-        <p:txBody>
-          <a:bodyPr/>
-          <a:lstStyle/>
-          <a:p>
-            <a:endParaRPr lang="en-US"/>
-          </a:p>
-        </p:txBody>
-      </p:sp>
-      <p:sp>
-        <p:nvSpPr>
-          <p:cNvPr id="3" name="Text Placeholder 2">
-            <a:extLst>
-              <a:ext uri="{FF2B5EF4-FFF2-40B4-BE49-F238E27FC236}">
-                <a16:creationId xmlns:a16="http://schemas.microsoft.com/office/drawing/2014/main" id="{FA9F22A2-6A92-384F-9FF9-56AE9A6AF796}"/>
-              </a:ext>
-            </a:extLst>
-          </p:cNvPr>
-          <p:cNvSpPr>
-            <a:spLocks noGrp="1"/>
-          </p:cNvSpPr>
-          <p:nvPr>
-            <p:ph type="body" sz="quarter" idx="12"/>
-          </p:nvPr>
-        </p:nvSpPr>
-        <p:spPr>
-          <a:xfrm>
-            <a:off x="949123" y="359330"/>
-            <a:ext cx="10955577" cy="5910977"/>
-          </a:xfrm>
-        </p:spPr>
-        <p:txBody>
-          <a:bodyPr/>
-          <a:lstStyle/>
-          <a:p>
-            <a:r>
-              <a:rPr lang="en-US" b="1" dirty="0">
-                <a:solidFill>
-                  <a:srgbClr val="000000"/>
-                </a:solidFill>
-                <a:latin typeface="Consolas" panose="020B0609020204030204" pitchFamily="49" charset="0"/>
-              </a:rPr>
-              <a:t>birds </a:t>
-            </a:r>
-            <a:r>
-              <a:rPr lang="en-US" b="1" dirty="0">
-                <a:solidFill>
-                  <a:srgbClr val="CE5C00"/>
-                </a:solidFill>
-                <a:latin typeface="Consolas" panose="020B0609020204030204" pitchFamily="49" charset="0"/>
-              </a:rPr>
-              <a:t>= </a:t>
-            </a:r>
-            <a:r>
-              <a:rPr lang="en-US" b="1" dirty="0">
-                <a:solidFill>
-                  <a:srgbClr val="000000"/>
-                </a:solidFill>
-                <a:latin typeface="Consolas" panose="020B0609020204030204" pitchFamily="49" charset="0"/>
-              </a:rPr>
-              <a:t>{}</a:t>
-            </a:r>
-          </a:p>
-          <a:p>
-            <a:endParaRPr lang="en-US" b="1" dirty="0">
-              <a:latin typeface="Consolas" panose="020B0609020204030204" pitchFamily="49" charset="0"/>
-            </a:endParaRPr>
-          </a:p>
-          <a:p>
-            <a:r>
-              <a:rPr lang="en-US" b="1" dirty="0">
-                <a:solidFill>
-                  <a:srgbClr val="000000"/>
-                </a:solidFill>
-                <a:latin typeface="Consolas" panose="020B0609020204030204" pitchFamily="49" charset="0"/>
-              </a:rPr>
-              <a:t>f </a:t>
-            </a:r>
-            <a:r>
-              <a:rPr lang="en-US" b="1" dirty="0">
-                <a:solidFill>
-                  <a:srgbClr val="CE5C00"/>
-                </a:solidFill>
-                <a:latin typeface="Consolas" panose="020B0609020204030204" pitchFamily="49" charset="0"/>
-              </a:rPr>
-              <a:t>= </a:t>
-            </a:r>
-            <a:r>
-              <a:rPr lang="en-US" b="1" dirty="0">
-                <a:solidFill>
-                  <a:srgbClr val="204A87"/>
-                </a:solidFill>
-                <a:latin typeface="Consolas" panose="020B0609020204030204" pitchFamily="49" charset="0"/>
-              </a:rPr>
-              <a:t>open</a:t>
-            </a:r>
-            <a:r>
-              <a:rPr lang="en-US" b="1" dirty="0">
-                <a:solidFill>
-                  <a:srgbClr val="000000"/>
-                </a:solidFill>
-                <a:latin typeface="Consolas" panose="020B0609020204030204" pitchFamily="49" charset="0"/>
-              </a:rPr>
-              <a:t>(</a:t>
-            </a:r>
-            <a:r>
-              <a:rPr lang="en-US" b="1" dirty="0">
-                <a:solidFill>
-                  <a:srgbClr val="4E9A06"/>
-                </a:solidFill>
-                <a:latin typeface="Consolas" panose="020B0609020204030204" pitchFamily="49" charset="0"/>
-              </a:rPr>
-              <a:t>'</a:t>
-            </a:r>
-            <a:r>
-              <a:rPr lang="en-US" b="1" dirty="0" err="1">
-                <a:solidFill>
-                  <a:srgbClr val="4E9A06"/>
-                </a:solidFill>
-                <a:latin typeface="Consolas" panose="020B0609020204030204" pitchFamily="49" charset="0"/>
-              </a:rPr>
-              <a:t>birds_repeats.txt</a:t>
-            </a:r>
-            <a:r>
-              <a:rPr lang="en-US" b="1" dirty="0">
-                <a:solidFill>
-                  <a:srgbClr val="4E9A06"/>
-                </a:solidFill>
-                <a:latin typeface="Consolas" panose="020B0609020204030204" pitchFamily="49" charset="0"/>
-              </a:rPr>
-              <a:t>'</a:t>
-            </a:r>
-            <a:r>
-              <a:rPr lang="en-US" b="1" dirty="0">
-                <a:solidFill>
-                  <a:srgbClr val="000000"/>
-                </a:solidFill>
-                <a:latin typeface="Consolas" panose="020B0609020204030204" pitchFamily="49" charset="0"/>
-              </a:rPr>
-              <a:t>)</a:t>
-            </a:r>
-          </a:p>
-          <a:p>
-            <a:r>
-              <a:rPr lang="en-US" b="1" dirty="0">
-                <a:solidFill>
-                  <a:srgbClr val="204A87"/>
-                </a:solidFill>
-                <a:latin typeface="Consolas" panose="020B0609020204030204" pitchFamily="49" charset="0"/>
-              </a:rPr>
-              <a:t>for </a:t>
-            </a:r>
-            <a:r>
-              <a:rPr lang="en-US" b="1" dirty="0">
-                <a:solidFill>
-                  <a:srgbClr val="000000"/>
-                </a:solidFill>
-                <a:latin typeface="Consolas" panose="020B0609020204030204" pitchFamily="49" charset="0"/>
-              </a:rPr>
-              <a:t>line </a:t>
-            </a:r>
-            <a:r>
-              <a:rPr lang="en-US" b="1" dirty="0">
-                <a:solidFill>
-                  <a:srgbClr val="204A87"/>
-                </a:solidFill>
-                <a:latin typeface="Consolas" panose="020B0609020204030204" pitchFamily="49" charset="0"/>
-              </a:rPr>
-              <a:t>in </a:t>
-            </a:r>
-            <a:r>
-              <a:rPr lang="en-US" b="1" dirty="0">
-                <a:solidFill>
-                  <a:srgbClr val="000000"/>
-                </a:solidFill>
-                <a:latin typeface="Consolas" panose="020B0609020204030204" pitchFamily="49" charset="0"/>
-              </a:rPr>
-              <a:t>f:</a:t>
-            </a:r>
-          </a:p>
-          <a:p>
-            <a:r>
-              <a:rPr lang="en-US" b="1" dirty="0">
-                <a:latin typeface="Consolas" panose="020B0609020204030204" pitchFamily="49" charset="0"/>
-              </a:rPr>
-              <a:t>    </a:t>
-            </a:r>
-            <a:r>
-              <a:rPr lang="en-US" b="1" dirty="0">
-                <a:solidFill>
-                  <a:srgbClr val="000000"/>
-                </a:solidFill>
-                <a:latin typeface="Consolas" panose="020B0609020204030204" pitchFamily="49" charset="0"/>
-              </a:rPr>
-              <a:t>fields </a:t>
-            </a:r>
-            <a:r>
-              <a:rPr lang="en-US" b="1" dirty="0">
-                <a:solidFill>
-                  <a:srgbClr val="CE5C00"/>
-                </a:solidFill>
-                <a:latin typeface="Consolas" panose="020B0609020204030204" pitchFamily="49" charset="0"/>
-              </a:rPr>
-              <a:t>= </a:t>
-            </a:r>
-            <a:r>
-              <a:rPr lang="en-US" b="1" dirty="0" err="1">
-                <a:solidFill>
-                  <a:srgbClr val="000000"/>
-                </a:solidFill>
-                <a:latin typeface="Consolas" panose="020B0609020204030204" pitchFamily="49" charset="0"/>
-              </a:rPr>
-              <a:t>line</a:t>
-            </a:r>
-            <a:r>
-              <a:rPr lang="en-US" b="1" dirty="0" err="1">
-                <a:solidFill>
-                  <a:srgbClr val="CE5C00"/>
-                </a:solidFill>
-                <a:latin typeface="Consolas" panose="020B0609020204030204" pitchFamily="49" charset="0"/>
-              </a:rPr>
-              <a:t>.</a:t>
-            </a:r>
-            <a:r>
-              <a:rPr lang="en-US" b="1" dirty="0" err="1">
-                <a:solidFill>
-                  <a:srgbClr val="000000"/>
-                </a:solidFill>
-                <a:latin typeface="Consolas" panose="020B0609020204030204" pitchFamily="49" charset="0"/>
-              </a:rPr>
-              <a:t>split</a:t>
-            </a:r>
-            <a:r>
-              <a:rPr lang="en-US" b="1" dirty="0">
-                <a:solidFill>
-                  <a:srgbClr val="000000"/>
-                </a:solidFill>
-                <a:latin typeface="Consolas" panose="020B0609020204030204" pitchFamily="49" charset="0"/>
-              </a:rPr>
-              <a:t>()</a:t>
-            </a:r>
-          </a:p>
-          <a:p>
-            <a:r>
-              <a:rPr lang="en-US" b="1" dirty="0">
-                <a:latin typeface="Consolas" panose="020B0609020204030204" pitchFamily="49" charset="0"/>
-              </a:rPr>
-              <a:t>    </a:t>
-            </a:r>
-            <a:r>
-              <a:rPr lang="en-US" b="1" dirty="0" err="1">
-                <a:solidFill>
-                  <a:srgbClr val="000000"/>
-                </a:solidFill>
-                <a:latin typeface="Consolas" panose="020B0609020204030204" pitchFamily="49" charset="0"/>
-              </a:rPr>
-              <a:t>bird_name</a:t>
-            </a:r>
-            <a:r>
-              <a:rPr lang="en-US" b="1" dirty="0">
-                <a:solidFill>
-                  <a:srgbClr val="000000"/>
-                </a:solidFill>
-                <a:latin typeface="Consolas" panose="020B0609020204030204" pitchFamily="49" charset="0"/>
-              </a:rPr>
-              <a:t> </a:t>
-            </a:r>
-            <a:r>
-              <a:rPr lang="en-US" b="1" dirty="0">
-                <a:solidFill>
-                  <a:srgbClr val="CE5C00"/>
-                </a:solidFill>
-                <a:latin typeface="Consolas" panose="020B0609020204030204" pitchFamily="49" charset="0"/>
-              </a:rPr>
-              <a:t>= </a:t>
-            </a:r>
-            <a:r>
-              <a:rPr lang="en-US" b="1" dirty="0">
-                <a:solidFill>
-                  <a:srgbClr val="000000"/>
-                </a:solidFill>
-                <a:latin typeface="Consolas" panose="020B0609020204030204" pitchFamily="49" charset="0"/>
-              </a:rPr>
-              <a:t>fields[</a:t>
-            </a:r>
-            <a:r>
-              <a:rPr lang="en-US" b="1" dirty="0">
-                <a:solidFill>
-                  <a:srgbClr val="0000CF"/>
-                </a:solidFill>
-                <a:latin typeface="Consolas" panose="020B0609020204030204" pitchFamily="49" charset="0"/>
-              </a:rPr>
-              <a:t>0</a:t>
-            </a:r>
-            <a:r>
-              <a:rPr lang="en-US" b="1" dirty="0">
-                <a:solidFill>
-                  <a:srgbClr val="000000"/>
-                </a:solidFill>
-                <a:latin typeface="Consolas" panose="020B0609020204030204" pitchFamily="49" charset="0"/>
-              </a:rPr>
-              <a:t>]</a:t>
-            </a:r>
-          </a:p>
-          <a:p>
-            <a:r>
-              <a:rPr lang="en-US" b="1" dirty="0">
-                <a:latin typeface="Consolas" panose="020B0609020204030204" pitchFamily="49" charset="0"/>
-              </a:rPr>
-              <a:t>    </a:t>
-            </a:r>
-            <a:r>
-              <a:rPr lang="en-US" b="1" dirty="0" err="1">
-                <a:solidFill>
-                  <a:srgbClr val="000000"/>
-                </a:solidFill>
-                <a:latin typeface="Consolas" panose="020B0609020204030204" pitchFamily="49" charset="0"/>
-              </a:rPr>
-              <a:t>bird_count</a:t>
-            </a:r>
-            <a:r>
-              <a:rPr lang="en-US" b="1" dirty="0">
-                <a:solidFill>
-                  <a:srgbClr val="000000"/>
-                </a:solidFill>
-                <a:latin typeface="Consolas" panose="020B0609020204030204" pitchFamily="49" charset="0"/>
-              </a:rPr>
-              <a:t> </a:t>
-            </a:r>
-            <a:r>
-              <a:rPr lang="en-US" b="1" dirty="0">
-                <a:solidFill>
-                  <a:srgbClr val="CE5C00"/>
-                </a:solidFill>
-                <a:latin typeface="Consolas" panose="020B0609020204030204" pitchFamily="49" charset="0"/>
-              </a:rPr>
-              <a:t>= </a:t>
-            </a:r>
-            <a:r>
-              <a:rPr lang="en-US" b="1" dirty="0" err="1">
-                <a:solidFill>
-                  <a:srgbClr val="204A87"/>
-                </a:solidFill>
-                <a:latin typeface="Consolas" panose="020B0609020204030204" pitchFamily="49" charset="0"/>
-              </a:rPr>
-              <a:t>int</a:t>
-            </a:r>
-            <a:r>
-              <a:rPr lang="en-US" b="1" dirty="0">
-                <a:solidFill>
-                  <a:srgbClr val="000000"/>
-                </a:solidFill>
-                <a:latin typeface="Consolas" panose="020B0609020204030204" pitchFamily="49" charset="0"/>
-              </a:rPr>
-              <a:t>(fields[</a:t>
-            </a:r>
-            <a:r>
-              <a:rPr lang="en-US" b="1" dirty="0">
-                <a:solidFill>
-                  <a:srgbClr val="0000CF"/>
-                </a:solidFill>
-                <a:latin typeface="Consolas" panose="020B0609020204030204" pitchFamily="49" charset="0"/>
-              </a:rPr>
-              <a:t>1</a:t>
-            </a:r>
-            <a:r>
-              <a:rPr lang="en-US" b="1" dirty="0">
-                <a:solidFill>
-                  <a:srgbClr val="000000"/>
-                </a:solidFill>
-                <a:latin typeface="Consolas" panose="020B0609020204030204" pitchFamily="49" charset="0"/>
-              </a:rPr>
-              <a:t>])</a:t>
-            </a:r>
-          </a:p>
-          <a:p>
-            <a:r>
-              <a:rPr lang="en-US" b="1" dirty="0">
-                <a:highlight>
-                  <a:srgbClr val="FFFF00"/>
-                </a:highlight>
-                <a:latin typeface="Consolas" panose="020B0609020204030204" pitchFamily="49" charset="0"/>
-              </a:rPr>
-              <a:t>    </a:t>
-            </a:r>
-            <a:r>
-              <a:rPr lang="en-US" b="1" dirty="0">
-                <a:solidFill>
-                  <a:srgbClr val="204A87"/>
-                </a:solidFill>
-                <a:highlight>
-                  <a:srgbClr val="FFFF00"/>
-                </a:highlight>
-                <a:latin typeface="Consolas" panose="020B0609020204030204" pitchFamily="49" charset="0"/>
-              </a:rPr>
-              <a:t>if </a:t>
-            </a:r>
-            <a:r>
-              <a:rPr lang="en-US" b="1" dirty="0" err="1">
-                <a:solidFill>
-                  <a:srgbClr val="000000"/>
-                </a:solidFill>
-                <a:highlight>
-                  <a:srgbClr val="FFFF00"/>
-                </a:highlight>
-                <a:latin typeface="Consolas" panose="020B0609020204030204" pitchFamily="49" charset="0"/>
-              </a:rPr>
-              <a:t>bird_name</a:t>
-            </a:r>
-            <a:r>
-              <a:rPr lang="en-US" b="1" dirty="0">
-                <a:solidFill>
-                  <a:srgbClr val="000000"/>
-                </a:solidFill>
-                <a:highlight>
-                  <a:srgbClr val="FFFF00"/>
-                </a:highlight>
-                <a:latin typeface="Consolas" panose="020B0609020204030204" pitchFamily="49" charset="0"/>
-              </a:rPr>
-              <a:t> </a:t>
-            </a:r>
-            <a:r>
-              <a:rPr lang="en-US" b="1" dirty="0">
-                <a:solidFill>
-                  <a:srgbClr val="204A87"/>
-                </a:solidFill>
-                <a:highlight>
-                  <a:srgbClr val="FFFF00"/>
-                </a:highlight>
-                <a:latin typeface="Consolas" panose="020B0609020204030204" pitchFamily="49" charset="0"/>
-              </a:rPr>
-              <a:t>in </a:t>
-            </a:r>
-            <a:r>
-              <a:rPr lang="en-US" b="1" dirty="0">
-                <a:solidFill>
-                  <a:srgbClr val="000000"/>
-                </a:solidFill>
-                <a:highlight>
-                  <a:srgbClr val="FFFF00"/>
-                </a:highlight>
-                <a:latin typeface="Consolas" panose="020B0609020204030204" pitchFamily="49" charset="0"/>
-              </a:rPr>
-              <a:t>birds:</a:t>
-            </a:r>
-          </a:p>
-          <a:p>
-            <a:r>
-              <a:rPr lang="en-US" b="1" dirty="0">
-                <a:highlight>
-                  <a:srgbClr val="FFFF00"/>
-                </a:highlight>
-                <a:latin typeface="Consolas" panose="020B0609020204030204" pitchFamily="49" charset="0"/>
-              </a:rPr>
-              <a:t>        </a:t>
-            </a:r>
-            <a:r>
-              <a:rPr lang="en-US" b="1" dirty="0">
-                <a:solidFill>
-                  <a:srgbClr val="000000"/>
-                </a:solidFill>
-                <a:highlight>
-                  <a:srgbClr val="FFFF00"/>
-                </a:highlight>
-                <a:latin typeface="Consolas" panose="020B0609020204030204" pitchFamily="49" charset="0"/>
-              </a:rPr>
-              <a:t>birds[</a:t>
-            </a:r>
-            <a:r>
-              <a:rPr lang="en-US" b="1" dirty="0" err="1">
-                <a:solidFill>
-                  <a:srgbClr val="000000"/>
-                </a:solidFill>
-                <a:highlight>
-                  <a:srgbClr val="FFFF00"/>
-                </a:highlight>
-                <a:latin typeface="Consolas" panose="020B0609020204030204" pitchFamily="49" charset="0"/>
-              </a:rPr>
-              <a:t>bird_name</a:t>
-            </a:r>
-            <a:r>
-              <a:rPr lang="en-US" b="1" dirty="0">
-                <a:solidFill>
-                  <a:srgbClr val="000000"/>
-                </a:solidFill>
-                <a:highlight>
-                  <a:srgbClr val="FFFF00"/>
-                </a:highlight>
-                <a:latin typeface="Consolas" panose="020B0609020204030204" pitchFamily="49" charset="0"/>
-              </a:rPr>
-              <a:t>] </a:t>
-            </a:r>
-            <a:r>
-              <a:rPr lang="en-US" b="1" dirty="0">
-                <a:solidFill>
-                  <a:srgbClr val="CE5C00"/>
-                </a:solidFill>
-                <a:highlight>
-                  <a:srgbClr val="FFFF00"/>
-                </a:highlight>
-                <a:latin typeface="Consolas" panose="020B0609020204030204" pitchFamily="49" charset="0"/>
-              </a:rPr>
-              <a:t>= </a:t>
-            </a:r>
-            <a:r>
-              <a:rPr lang="en-US" b="1" dirty="0">
-                <a:solidFill>
-                  <a:srgbClr val="000000"/>
-                </a:solidFill>
-                <a:highlight>
-                  <a:srgbClr val="FFFF00"/>
-                </a:highlight>
-                <a:latin typeface="Consolas" panose="020B0609020204030204" pitchFamily="49" charset="0"/>
-              </a:rPr>
-              <a:t>birds[</a:t>
-            </a:r>
-            <a:r>
-              <a:rPr lang="en-US" b="1" dirty="0" err="1">
-                <a:solidFill>
-                  <a:srgbClr val="000000"/>
-                </a:solidFill>
-                <a:highlight>
-                  <a:srgbClr val="FFFF00"/>
-                </a:highlight>
-                <a:latin typeface="Consolas" panose="020B0609020204030204" pitchFamily="49" charset="0"/>
-              </a:rPr>
-              <a:t>bird_name</a:t>
-            </a:r>
-            <a:r>
-              <a:rPr lang="en-US" b="1" dirty="0">
-                <a:solidFill>
-                  <a:srgbClr val="000000"/>
-                </a:solidFill>
-                <a:highlight>
-                  <a:srgbClr val="FFFF00"/>
-                </a:highlight>
-                <a:latin typeface="Consolas" panose="020B0609020204030204" pitchFamily="49" charset="0"/>
-              </a:rPr>
-              <a:t>] </a:t>
-            </a:r>
-            <a:r>
-              <a:rPr lang="en-US" b="1" dirty="0">
-                <a:solidFill>
-                  <a:srgbClr val="CE5C00"/>
-                </a:solidFill>
-                <a:highlight>
-                  <a:srgbClr val="FFFF00"/>
-                </a:highlight>
-                <a:latin typeface="Consolas" panose="020B0609020204030204" pitchFamily="49" charset="0"/>
-              </a:rPr>
-              <a:t>+ </a:t>
-            </a:r>
-            <a:r>
-              <a:rPr lang="en-US" b="1" dirty="0" err="1">
-                <a:solidFill>
-                  <a:srgbClr val="000000"/>
-                </a:solidFill>
-                <a:highlight>
-                  <a:srgbClr val="FFFF00"/>
-                </a:highlight>
-                <a:latin typeface="Consolas" panose="020B0609020204030204" pitchFamily="49" charset="0"/>
-              </a:rPr>
-              <a:t>bird_count</a:t>
-            </a:r>
-            <a:endParaRPr lang="en-US" b="1" dirty="0">
-              <a:solidFill>
-                <a:srgbClr val="000000"/>
-              </a:solidFill>
-              <a:highlight>
-                <a:srgbClr val="FFFF00"/>
-              </a:highlight>
-              <a:latin typeface="Consolas" panose="020B0609020204030204" pitchFamily="49" charset="0"/>
-            </a:endParaRPr>
-          </a:p>
-          <a:p>
-            <a:r>
-              <a:rPr lang="en-US" b="1" dirty="0">
-                <a:highlight>
-                  <a:srgbClr val="FFFF00"/>
-                </a:highlight>
-                <a:latin typeface="Consolas" panose="020B0609020204030204" pitchFamily="49" charset="0"/>
-              </a:rPr>
-              <a:t>    </a:t>
-            </a:r>
-            <a:r>
-              <a:rPr lang="en-US" b="1" dirty="0">
-                <a:solidFill>
-                  <a:srgbClr val="204A87"/>
-                </a:solidFill>
-                <a:highlight>
-                  <a:srgbClr val="FFFF00"/>
-                </a:highlight>
-                <a:latin typeface="Consolas" panose="020B0609020204030204" pitchFamily="49" charset="0"/>
-              </a:rPr>
-              <a:t>else</a:t>
-            </a:r>
-            <a:r>
-              <a:rPr lang="en-US" b="1" dirty="0">
-                <a:solidFill>
-                  <a:srgbClr val="000000"/>
-                </a:solidFill>
-                <a:highlight>
-                  <a:srgbClr val="FFFF00"/>
-                </a:highlight>
-                <a:latin typeface="Consolas" panose="020B0609020204030204" pitchFamily="49" charset="0"/>
-              </a:rPr>
-              <a:t>:</a:t>
-            </a:r>
-          </a:p>
-          <a:p>
-            <a:r>
-              <a:rPr lang="en-US" b="1" dirty="0">
-                <a:highlight>
-                  <a:srgbClr val="FFFF00"/>
-                </a:highlight>
-                <a:latin typeface="Consolas" panose="020B0609020204030204" pitchFamily="49" charset="0"/>
-              </a:rPr>
-              <a:t>        </a:t>
-            </a:r>
-            <a:r>
-              <a:rPr lang="en-US" b="1" dirty="0">
-                <a:solidFill>
-                  <a:srgbClr val="000000"/>
-                </a:solidFill>
-                <a:highlight>
-                  <a:srgbClr val="FFFF00"/>
-                </a:highlight>
-                <a:latin typeface="Consolas" panose="020B0609020204030204" pitchFamily="49" charset="0"/>
-              </a:rPr>
-              <a:t>birds[</a:t>
-            </a:r>
-            <a:r>
-              <a:rPr lang="en-US" b="1" dirty="0" err="1">
-                <a:solidFill>
-                  <a:srgbClr val="000000"/>
-                </a:solidFill>
-                <a:highlight>
-                  <a:srgbClr val="FFFF00"/>
-                </a:highlight>
-                <a:latin typeface="Consolas" panose="020B0609020204030204" pitchFamily="49" charset="0"/>
-              </a:rPr>
-              <a:t>bird_name</a:t>
-            </a:r>
-            <a:r>
-              <a:rPr lang="en-US" b="1" dirty="0">
-                <a:solidFill>
-                  <a:srgbClr val="000000"/>
-                </a:solidFill>
-                <a:highlight>
-                  <a:srgbClr val="FFFF00"/>
-                </a:highlight>
-                <a:latin typeface="Consolas" panose="020B0609020204030204" pitchFamily="49" charset="0"/>
-              </a:rPr>
-              <a:t>] </a:t>
-            </a:r>
-            <a:r>
-              <a:rPr lang="en-US" b="1" dirty="0">
-                <a:solidFill>
-                  <a:srgbClr val="CE5C00"/>
-                </a:solidFill>
-                <a:highlight>
-                  <a:srgbClr val="FFFF00"/>
-                </a:highlight>
-                <a:latin typeface="Consolas" panose="020B0609020204030204" pitchFamily="49" charset="0"/>
-              </a:rPr>
-              <a:t>= </a:t>
-            </a:r>
-            <a:r>
-              <a:rPr lang="en-US" b="1" dirty="0" err="1">
-                <a:solidFill>
-                  <a:srgbClr val="000000"/>
-                </a:solidFill>
-                <a:highlight>
-                  <a:srgbClr val="FFFF00"/>
-                </a:highlight>
-                <a:latin typeface="Consolas" panose="020B0609020204030204" pitchFamily="49" charset="0"/>
-              </a:rPr>
-              <a:t>bird_count</a:t>
-            </a:r>
-            <a:endParaRPr lang="en-US" b="1" dirty="0">
-              <a:solidFill>
-                <a:srgbClr val="000000"/>
-              </a:solidFill>
-              <a:highlight>
-                <a:srgbClr val="FFFF00"/>
-              </a:highlight>
-              <a:latin typeface="Consolas" panose="020B0609020204030204" pitchFamily="49" charset="0"/>
-            </a:endParaRPr>
-          </a:p>
-          <a:p>
-            <a:r>
-              <a:rPr lang="en-US" b="1" dirty="0" err="1">
-                <a:solidFill>
-                  <a:srgbClr val="000000"/>
-                </a:solidFill>
-                <a:latin typeface="Consolas" panose="020B0609020204030204" pitchFamily="49" charset="0"/>
-              </a:rPr>
-              <a:t>f</a:t>
-            </a:r>
-            <a:r>
-              <a:rPr lang="en-US" b="1" dirty="0" err="1">
-                <a:solidFill>
-                  <a:srgbClr val="CE5C00"/>
-                </a:solidFill>
-                <a:latin typeface="Consolas" panose="020B0609020204030204" pitchFamily="49" charset="0"/>
-              </a:rPr>
-              <a:t>.</a:t>
-            </a:r>
-            <a:r>
-              <a:rPr lang="en-US" b="1" dirty="0" err="1">
-                <a:solidFill>
-                  <a:srgbClr val="000000"/>
-                </a:solidFill>
-                <a:latin typeface="Consolas" panose="020B0609020204030204" pitchFamily="49" charset="0"/>
-              </a:rPr>
-              <a:t>close</a:t>
-            </a:r>
-            <a:r>
-              <a:rPr lang="en-US" b="1" dirty="0">
-                <a:solidFill>
-                  <a:srgbClr val="000000"/>
-                </a:solidFill>
-                <a:latin typeface="Consolas" panose="020B0609020204030204" pitchFamily="49" charset="0"/>
-              </a:rPr>
-              <a:t>()</a:t>
-            </a:r>
-          </a:p>
-          <a:p>
-            <a:endParaRPr lang="en-US" b="1" dirty="0">
-              <a:latin typeface="Consolas" panose="020B0609020204030204" pitchFamily="49" charset="0"/>
-            </a:endParaRPr>
-          </a:p>
-          <a:p>
-            <a:r>
-              <a:rPr lang="en-US" b="1" dirty="0">
-                <a:latin typeface="Consolas" panose="020B0609020204030204" pitchFamily="49" charset="0"/>
-              </a:rPr>
-              <a:t>…</a:t>
-            </a:r>
-          </a:p>
-        </p:txBody>
-      </p:sp>
-      <p:sp>
-        <p:nvSpPr>
-          <p:cNvPr id="4" name="TextBox 3">
-            <a:extLst>
-              <a:ext uri="{FF2B5EF4-FFF2-40B4-BE49-F238E27FC236}">
-                <a16:creationId xmlns:a16="http://schemas.microsoft.com/office/drawing/2014/main" id="{5959FB74-6900-C047-B126-1A0CCBC6B06B}"/>
-              </a:ext>
-            </a:extLst>
-          </p:cNvPr>
-          <p:cNvSpPr txBox="1"/>
-          <p:nvPr/>
-        </p:nvSpPr>
-        <p:spPr>
-          <a:xfrm>
-            <a:off x="2210937" y="6564573"/>
-            <a:ext cx="1390124" cy="369332"/>
-          </a:xfrm>
-          <a:prstGeom prst="rect">
-            <a:avLst/>
-          </a:prstGeom>
-          <a:noFill/>
-        </p:spPr>
-        <p:txBody>
-          <a:bodyPr wrap="none" rtlCol="0">
-            <a:spAutoFit/>
-          </a:bodyPr>
-          <a:lstStyle/>
-          <a:p>
-            <a:r>
-              <a:rPr lang="en-US" dirty="0"/>
-              <a:t>&lt;birds2.py&gt;</a:t>
-            </a:r>
-          </a:p>
-        </p:txBody>
-      </p:sp>
-    </p:spTree>
-    <p:extLst>
-      <p:ext uri="{BB962C8B-B14F-4D97-AF65-F5344CB8AC3E}">
-        <p14:creationId xmlns:p14="http://schemas.microsoft.com/office/powerpoint/2010/main" val="6769541"/>
-      </p:ext>
-    </p:extLst>
-  </p:cSld>
-  <p:clrMapOvr>
-    <a:masterClrMapping/>
-  </p:clrMapOvr>
-</p:sld>
-</file>
-
-<file path=ppt/slides/slide105.xml><?xml version="1.0" encoding="utf-8"?>
-<p:sld xmlns:a="http://schemas.openxmlformats.org/drawingml/2006/main" xmlns:r="http://schemas.openxmlformats.org/officeDocument/2006/relationships" xmlns:p="http://schemas.openxmlformats.org/presentationml/2006/main">
-  <p:cSld>
-    <p:spTree>
-      <p:nvGrpSpPr>
-        <p:cNvPr id="1" name=""/>
-        <p:cNvGrpSpPr/>
-        <p:nvPr/>
-      </p:nvGrpSpPr>
-      <p:grpSpPr>
-        <a:xfrm>
-          <a:off x="0" y="0"/>
-          <a:ext cx="0" cy="0"/>
-          <a:chOff x="0" y="0"/>
-          <a:chExt cx="0" cy="0"/>
-        </a:xfrm>
-      </p:grpSpPr>
-      <p:sp>
-        <p:nvSpPr>
-          <p:cNvPr id="2" name="Text Placeholder 1">
-            <a:extLst>
-              <a:ext uri="{FF2B5EF4-FFF2-40B4-BE49-F238E27FC236}">
-                <a16:creationId xmlns:a16="http://schemas.microsoft.com/office/drawing/2014/main" id="{95D82BD1-7E22-8445-A7CF-7B2864EEC58D}"/>
-              </a:ext>
-            </a:extLst>
-          </p:cNvPr>
-          <p:cNvSpPr>
-            <a:spLocks noGrp="1"/>
-          </p:cNvSpPr>
-          <p:nvPr>
-            <p:ph type="body" sz="quarter" idx="10"/>
-          </p:nvPr>
-        </p:nvSpPr>
-        <p:spPr/>
-        <p:txBody>
-          <a:bodyPr/>
-          <a:lstStyle/>
-          <a:p>
-            <a:r>
-              <a:rPr lang="en-US" dirty="0"/>
-              <a:t>The only difference is in the lines where we add the new pair to the dictionary</a:t>
-            </a:r>
-          </a:p>
-          <a:p>
-            <a:r>
-              <a:rPr lang="en-US" dirty="0"/>
-              <a:t>Now if the pair is already there, we </a:t>
-            </a:r>
-            <a:r>
-              <a:rPr lang="en-US" i="1" dirty="0"/>
-              <a:t>add</a:t>
-            </a:r>
-            <a:r>
-              <a:rPr lang="en-US" dirty="0"/>
-              <a:t> the new count to the previous value</a:t>
-            </a:r>
-          </a:p>
-          <a:p>
-            <a:r>
-              <a:rPr lang="en-US" dirty="0"/>
-              <a:t>If it isn't, we create a new key/value pair</a:t>
-            </a:r>
-          </a:p>
-        </p:txBody>
-      </p:sp>
-    </p:spTree>
-    <p:extLst>
-      <p:ext uri="{BB962C8B-B14F-4D97-AF65-F5344CB8AC3E}">
-        <p14:creationId xmlns:p14="http://schemas.microsoft.com/office/powerpoint/2010/main" val="2363012155"/>
-      </p:ext>
-    </p:extLst>
-  </p:cSld>
-  <p:clrMapOvr>
-    <a:masterClrMapping/>
-  </p:clrMapOvr>
-</p:sld>
-</file>
-
-<file path=ppt/slides/slide106.xml><?xml version="1.0" encoding="utf-8"?>
-<p:sld xmlns:a="http://schemas.openxmlformats.org/drawingml/2006/main" xmlns:r="http://schemas.openxmlformats.org/officeDocument/2006/relationships" xmlns:p="http://schemas.openxmlformats.org/presentationml/2006/main">
-  <p:cSld>
-    <p:spTree>
-      <p:nvGrpSpPr>
-        <p:cNvPr id="1" name=""/>
-        <p:cNvGrpSpPr/>
-        <p:nvPr/>
-      </p:nvGrpSpPr>
-      <p:grpSpPr>
-        <a:xfrm>
-          <a:off x="0" y="0"/>
-          <a:ext cx="0" cy="0"/>
-          <a:chOff x="0" y="0"/>
-          <a:chExt cx="0" cy="0"/>
-        </a:xfrm>
-      </p:grpSpPr>
-      <p:sp>
-        <p:nvSpPr>
-          <p:cNvPr id="2" name="Content Placeholder 1">
-            <a:extLst>
-              <a:ext uri="{FF2B5EF4-FFF2-40B4-BE49-F238E27FC236}">
-                <a16:creationId xmlns:a16="http://schemas.microsoft.com/office/drawing/2014/main" id="{98F753D4-3CDD-D446-BFDC-48713E2FA0D0}"/>
-              </a:ext>
-            </a:extLst>
-          </p:cNvPr>
-          <p:cNvSpPr>
-            <a:spLocks noGrp="1"/>
-          </p:cNvSpPr>
-          <p:nvPr>
-            <p:ph sz="quarter" idx="10"/>
-          </p:nvPr>
-        </p:nvSpPr>
-        <p:spPr/>
-        <p:txBody>
-          <a:bodyPr/>
-          <a:lstStyle/>
-          <a:p>
-            <a:r>
-              <a:rPr lang="en-US" dirty="0"/>
-              <a:t>$ python birds2.py</a:t>
-            </a:r>
-          </a:p>
-        </p:txBody>
-      </p:sp>
-    </p:spTree>
-    <p:extLst>
-      <p:ext uri="{BB962C8B-B14F-4D97-AF65-F5344CB8AC3E}">
-        <p14:creationId xmlns:p14="http://schemas.microsoft.com/office/powerpoint/2010/main" val="1130848344"/>
-      </p:ext>
-    </p:extLst>
-  </p:cSld>
-  <p:clrMapOvr>
-    <a:masterClrMapping/>
-  </p:clrMapOvr>
-</p:sld>
-</file>
-
-<file path=ppt/slides/slide107.xml><?xml version="1.0" encoding="utf-8"?>
-<p:sld xmlns:a="http://schemas.openxmlformats.org/drawingml/2006/main" xmlns:r="http://schemas.openxmlformats.org/officeDocument/2006/relationships" xmlns:p="http://schemas.openxmlformats.org/presentationml/2006/main">
-  <p:cSld>
-    <p:spTree>
-      <p:nvGrpSpPr>
-        <p:cNvPr id="1" name=""/>
-        <p:cNvGrpSpPr/>
-        <p:nvPr/>
-      </p:nvGrpSpPr>
-      <p:grpSpPr>
-        <a:xfrm>
-          <a:off x="0" y="0"/>
-          <a:ext cx="0" cy="0"/>
-          <a:chOff x="0" y="0"/>
-          <a:chExt cx="0" cy="0"/>
-        </a:xfrm>
-      </p:grpSpPr>
-      <p:sp>
-        <p:nvSpPr>
-          <p:cNvPr id="2" name="Text Placeholder 1">
-            <a:extLst>
-              <a:ext uri="{FF2B5EF4-FFF2-40B4-BE49-F238E27FC236}">
-                <a16:creationId xmlns:a16="http://schemas.microsoft.com/office/drawing/2014/main" id="{95D82BD1-7E22-8445-A7CF-7B2864EEC58D}"/>
-              </a:ext>
-            </a:extLst>
-          </p:cNvPr>
-          <p:cNvSpPr>
-            <a:spLocks noGrp="1"/>
-          </p:cNvSpPr>
-          <p:nvPr>
-            <p:ph type="body" sz="quarter" idx="10"/>
-          </p:nvPr>
-        </p:nvSpPr>
-        <p:spPr/>
-        <p:txBody>
-          <a:bodyPr/>
-          <a:lstStyle/>
-          <a:p>
-            <a:r>
-              <a:rPr lang="en-US" dirty="0"/>
-              <a:t>Both of these programs follow a common pattern for text files containing data</a:t>
-            </a:r>
-          </a:p>
-          <a:p>
-            <a:r>
-              <a:rPr lang="en-US" dirty="0"/>
-              <a:t>Each line in the file is a </a:t>
-            </a:r>
-            <a:r>
-              <a:rPr lang="en-US" i="1" dirty="0"/>
-              <a:t>row</a:t>
-            </a:r>
-            <a:r>
-              <a:rPr lang="en-US" dirty="0"/>
-              <a:t> of data of some sort. So we work with the file line-by-line, using </a:t>
-            </a:r>
-            <a:r>
-              <a:rPr lang="en-US" dirty="0" err="1"/>
-              <a:t>readlines</a:t>
-            </a:r>
-            <a:r>
-              <a:rPr lang="en-US" dirty="0"/>
-              <a:t>, </a:t>
-            </a:r>
-            <a:r>
-              <a:rPr lang="en-US" dirty="0" err="1"/>
-              <a:t>splitlines</a:t>
-            </a:r>
-            <a:r>
-              <a:rPr lang="en-US" dirty="0"/>
-              <a:t>, or a for loop</a:t>
-            </a:r>
-          </a:p>
-          <a:p>
-            <a:r>
-              <a:rPr lang="en-US" dirty="0"/>
-              <a:t>We then break each row apart into </a:t>
-            </a:r>
-            <a:r>
-              <a:rPr lang="en-US" i="1" dirty="0"/>
-              <a:t>fields</a:t>
-            </a:r>
-            <a:r>
-              <a:rPr lang="en-US" dirty="0"/>
-              <a:t> that have specific meanings using split() </a:t>
-            </a:r>
-          </a:p>
-          <a:p>
-            <a:r>
-              <a:rPr lang="en-US" dirty="0"/>
-              <a:t>File formats are very closely linked to the functions we use </a:t>
-            </a:r>
-            <a:r>
-              <a:rPr lang="en-US"/>
-              <a:t>to read </a:t>
-            </a:r>
-            <a:r>
-              <a:rPr lang="en-US" dirty="0"/>
-              <a:t>and write them</a:t>
-            </a:r>
-          </a:p>
-        </p:txBody>
-      </p:sp>
-    </p:spTree>
-    <p:extLst>
-      <p:ext uri="{BB962C8B-B14F-4D97-AF65-F5344CB8AC3E}">
-        <p14:creationId xmlns:p14="http://schemas.microsoft.com/office/powerpoint/2010/main" val="2918077592"/>
-      </p:ext>
-    </p:extLst>
-  </p:cSld>
-  <p:clrMapOvr>
-    <a:masterClrMapping/>
-  </p:clrMapOvr>
-</p:sld>
-</file>
-
 <file path=ppt/slides/slide11.xml><?xml version="1.0" encoding="utf-8"?>
 <p:sld xmlns:a="http://schemas.openxmlformats.org/drawingml/2006/main" xmlns:r="http://schemas.openxmlformats.org/officeDocument/2006/relationships" xmlns:p="http://schemas.openxmlformats.org/presentationml/2006/main">
   <p:cSld>
@@ -16613,1381 +15006,6 @@
     <p:extLst>
       <p:ext uri="{BB962C8B-B14F-4D97-AF65-F5344CB8AC3E}">
         <p14:creationId xmlns:p14="http://schemas.microsoft.com/office/powerpoint/2010/main" val="1740858003"/>
-      </p:ext>
-    </p:extLst>
-  </p:cSld>
-  <p:clrMapOvr>
-    <a:masterClrMapping/>
-  </p:clrMapOvr>
-</p:sld>
-</file>
-
-<file path=ppt/slides/slide93.xml><?xml version="1.0" encoding="utf-8"?>
-<p:sld xmlns:a="http://schemas.openxmlformats.org/drawingml/2006/main" xmlns:r="http://schemas.openxmlformats.org/officeDocument/2006/relationships" xmlns:p="http://schemas.openxmlformats.org/presentationml/2006/main">
-  <p:cSld>
-    <p:spTree>
-      <p:nvGrpSpPr>
-        <p:cNvPr id="1" name=""/>
-        <p:cNvGrpSpPr/>
-        <p:nvPr/>
-      </p:nvGrpSpPr>
-      <p:grpSpPr>
-        <a:xfrm>
-          <a:off x="0" y="0"/>
-          <a:ext cx="0" cy="0"/>
-          <a:chOff x="0" y="0"/>
-          <a:chExt cx="0" cy="0"/>
-        </a:xfrm>
-      </p:grpSpPr>
-      <p:sp>
-        <p:nvSpPr>
-          <p:cNvPr id="2" name="Text Placeholder 1">
-            <a:extLst>
-              <a:ext uri="{FF2B5EF4-FFF2-40B4-BE49-F238E27FC236}">
-                <a16:creationId xmlns:a16="http://schemas.microsoft.com/office/drawing/2014/main" id="{06E88012-EA37-4246-8DA9-19B4AF6595E1}"/>
-              </a:ext>
-            </a:extLst>
-          </p:cNvPr>
-          <p:cNvSpPr>
-            <a:spLocks noGrp="1"/>
-          </p:cNvSpPr>
-          <p:nvPr>
-            <p:ph type="body" sz="quarter" idx="10"/>
-          </p:nvPr>
-        </p:nvSpPr>
-        <p:spPr>
-          <a:xfrm>
-            <a:off x="3344863" y="1143000"/>
-            <a:ext cx="7593012" cy="2177006"/>
-          </a:xfrm>
-        </p:spPr>
-        <p:txBody>
-          <a:bodyPr/>
-          <a:lstStyle/>
-          <a:p>
-            <a:r>
-              <a:rPr lang="en-US" dirty="0">
-                <a:solidFill>
-                  <a:schemeClr val="bg1"/>
-                </a:solidFill>
-              </a:rPr>
-              <a:t>1</a:t>
-            </a:r>
-          </a:p>
-          <a:p>
-            <a:r>
-              <a:rPr lang="en-US" dirty="0">
-                <a:solidFill>
-                  <a:schemeClr val="bg1"/>
-                </a:solidFill>
-              </a:rPr>
-              <a:t>CTECH403_M1_09</a:t>
-            </a:r>
-          </a:p>
-          <a:p>
-            <a:r>
-              <a:rPr lang="en-US" dirty="0">
-                <a:solidFill>
-                  <a:schemeClr val="bg1"/>
-                </a:solidFill>
-              </a:rPr>
-              <a:t>Files and Dictionaries</a:t>
-            </a:r>
-          </a:p>
-        </p:txBody>
-      </p:sp>
-    </p:spTree>
-    <p:extLst>
-      <p:ext uri="{BB962C8B-B14F-4D97-AF65-F5344CB8AC3E}">
-        <p14:creationId xmlns:p14="http://schemas.microsoft.com/office/powerpoint/2010/main" val="2549867354"/>
-      </p:ext>
-    </p:extLst>
-  </p:cSld>
-  <p:clrMapOvr>
-    <a:masterClrMapping/>
-  </p:clrMapOvr>
-</p:sld>
-</file>
-
-<file path=ppt/slides/slide94.xml><?xml version="1.0" encoding="utf-8"?>
-<p:sld xmlns:a="http://schemas.openxmlformats.org/drawingml/2006/main" xmlns:r="http://schemas.openxmlformats.org/officeDocument/2006/relationships" xmlns:p="http://schemas.openxmlformats.org/presentationml/2006/main">
-  <p:cSld>
-    <p:spTree>
-      <p:nvGrpSpPr>
-        <p:cNvPr id="1" name=""/>
-        <p:cNvGrpSpPr/>
-        <p:nvPr/>
-      </p:nvGrpSpPr>
-      <p:grpSpPr>
-        <a:xfrm>
-          <a:off x="0" y="0"/>
-          <a:ext cx="0" cy="0"/>
-          <a:chOff x="0" y="0"/>
-          <a:chExt cx="0" cy="0"/>
-        </a:xfrm>
-      </p:grpSpPr>
-      <p:sp>
-        <p:nvSpPr>
-          <p:cNvPr id="2" name="Text Placeholder 1">
-            <a:extLst>
-              <a:ext uri="{FF2B5EF4-FFF2-40B4-BE49-F238E27FC236}">
-                <a16:creationId xmlns:a16="http://schemas.microsoft.com/office/drawing/2014/main" id="{9D71A82F-6D94-2A4C-8809-D36AF020C25B}"/>
-              </a:ext>
-            </a:extLst>
-          </p:cNvPr>
-          <p:cNvSpPr>
-            <a:spLocks noGrp="1"/>
-          </p:cNvSpPr>
-          <p:nvPr>
-            <p:ph type="body" sz="quarter" idx="10"/>
-          </p:nvPr>
-        </p:nvSpPr>
-        <p:spPr/>
-        <p:txBody>
-          <a:bodyPr/>
-          <a:lstStyle/>
-          <a:p>
-            <a:r>
-              <a:rPr lang="en-US" dirty="0"/>
-              <a:t>Here's another simple file format:</a:t>
-            </a:r>
-          </a:p>
-          <a:p>
-            <a:r>
-              <a:rPr lang="en-US" dirty="0"/>
-              <a:t>Suppose we run the aviary section of a zoo.</a:t>
-            </a:r>
-          </a:p>
-          <a:p>
-            <a:r>
-              <a:rPr lang="en-US" dirty="0"/>
-              <a:t>Here's a list of birds and how many of them there are in the zoo.</a:t>
-            </a:r>
-          </a:p>
-        </p:txBody>
-      </p:sp>
-    </p:spTree>
-    <p:extLst>
-      <p:ext uri="{BB962C8B-B14F-4D97-AF65-F5344CB8AC3E}">
-        <p14:creationId xmlns:p14="http://schemas.microsoft.com/office/powerpoint/2010/main" val="4073802277"/>
-      </p:ext>
-    </p:extLst>
-  </p:cSld>
-  <p:clrMapOvr>
-    <a:masterClrMapping/>
-  </p:clrMapOvr>
-</p:sld>
-</file>
-
-<file path=ppt/slides/slide95.xml><?xml version="1.0" encoding="utf-8"?>
-<p:sld xmlns:a="http://schemas.openxmlformats.org/drawingml/2006/main" xmlns:r="http://schemas.openxmlformats.org/officeDocument/2006/relationships" xmlns:p="http://schemas.openxmlformats.org/presentationml/2006/main">
-  <p:cSld>
-    <p:spTree>
-      <p:nvGrpSpPr>
-        <p:cNvPr id="1" name=""/>
-        <p:cNvGrpSpPr/>
-        <p:nvPr/>
-      </p:nvGrpSpPr>
-      <p:grpSpPr>
-        <a:xfrm>
-          <a:off x="0" y="0"/>
-          <a:ext cx="0" cy="0"/>
-          <a:chOff x="0" y="0"/>
-          <a:chExt cx="0" cy="0"/>
-        </a:xfrm>
-      </p:grpSpPr>
-      <p:sp>
-        <p:nvSpPr>
-          <p:cNvPr id="2" name="Text Placeholder 1">
-            <a:extLst>
-              <a:ext uri="{FF2B5EF4-FFF2-40B4-BE49-F238E27FC236}">
-                <a16:creationId xmlns:a16="http://schemas.microsoft.com/office/drawing/2014/main" id="{C88443E6-C573-5B42-935A-5265C158BA1D}"/>
-              </a:ext>
-            </a:extLst>
-          </p:cNvPr>
-          <p:cNvSpPr>
-            <a:spLocks noGrp="1"/>
-          </p:cNvSpPr>
-          <p:nvPr>
-            <p:ph type="body" sz="quarter" idx="11"/>
-          </p:nvPr>
-        </p:nvSpPr>
-        <p:spPr/>
-        <p:txBody>
-          <a:bodyPr/>
-          <a:lstStyle/>
-          <a:p>
-            <a:endParaRPr lang="en-US"/>
-          </a:p>
-        </p:txBody>
-      </p:sp>
-      <p:sp>
-        <p:nvSpPr>
-          <p:cNvPr id="3" name="Text Placeholder 2">
-            <a:extLst>
-              <a:ext uri="{FF2B5EF4-FFF2-40B4-BE49-F238E27FC236}">
-                <a16:creationId xmlns:a16="http://schemas.microsoft.com/office/drawing/2014/main" id="{0113DF52-4BD4-4544-BC4A-8105A42C3F1D}"/>
-              </a:ext>
-            </a:extLst>
-          </p:cNvPr>
-          <p:cNvSpPr>
-            <a:spLocks noGrp="1"/>
-          </p:cNvSpPr>
-          <p:nvPr>
-            <p:ph type="body" sz="quarter" idx="12"/>
-          </p:nvPr>
-        </p:nvSpPr>
-        <p:spPr>
-          <a:xfrm>
-            <a:off x="949123" y="359330"/>
-            <a:ext cx="10955577" cy="4664482"/>
-          </a:xfrm>
-        </p:spPr>
-        <p:txBody>
-          <a:bodyPr/>
-          <a:lstStyle/>
-          <a:p>
-            <a:r>
-              <a:rPr lang="en-US" b="1" dirty="0"/>
-              <a:t>sparrow 4</a:t>
-            </a:r>
-          </a:p>
-          <a:p>
-            <a:r>
-              <a:rPr lang="en-US" b="1" dirty="0"/>
-              <a:t>canary 4</a:t>
-            </a:r>
-          </a:p>
-          <a:p>
-            <a:r>
-              <a:rPr lang="en-US" b="1" dirty="0"/>
-              <a:t>parrot 2</a:t>
-            </a:r>
-          </a:p>
-          <a:p>
-            <a:r>
-              <a:rPr lang="en-US" b="1" dirty="0" err="1"/>
-              <a:t>bluejay</a:t>
-            </a:r>
-            <a:r>
-              <a:rPr lang="en-US" b="1" dirty="0"/>
-              <a:t> 1</a:t>
-            </a:r>
-          </a:p>
-          <a:p>
-            <a:r>
-              <a:rPr lang="en-US" b="1" dirty="0"/>
-              <a:t>macaw 8</a:t>
-            </a:r>
-          </a:p>
-          <a:p>
-            <a:r>
-              <a:rPr lang="en-US" b="1" dirty="0"/>
-              <a:t>crow 3</a:t>
-            </a:r>
-          </a:p>
-          <a:p>
-            <a:r>
-              <a:rPr lang="en-US" b="1" dirty="0"/>
-              <a:t>robin 1</a:t>
-            </a:r>
-          </a:p>
-          <a:p>
-            <a:r>
-              <a:rPr lang="en-US" b="1" dirty="0"/>
-              <a:t>pigeon 30</a:t>
-            </a:r>
-          </a:p>
-          <a:p>
-            <a:r>
-              <a:rPr lang="en-US" b="1" dirty="0"/>
-              <a:t>vulture 3</a:t>
-            </a:r>
-          </a:p>
-          <a:p>
-            <a:r>
-              <a:rPr lang="en-US" b="1" dirty="0"/>
-              <a:t>eagle 2</a:t>
-            </a:r>
-          </a:p>
-          <a:p>
-            <a:r>
-              <a:rPr lang="en-US" b="1" dirty="0"/>
-              <a:t>hawk 6</a:t>
-            </a:r>
-          </a:p>
-        </p:txBody>
-      </p:sp>
-      <p:sp>
-        <p:nvSpPr>
-          <p:cNvPr id="4" name="TextBox 3">
-            <a:extLst>
-              <a:ext uri="{FF2B5EF4-FFF2-40B4-BE49-F238E27FC236}">
-                <a16:creationId xmlns:a16="http://schemas.microsoft.com/office/drawing/2014/main" id="{4439B93F-399C-984D-910B-E4F3C3BDAF91}"/>
-              </a:ext>
-            </a:extLst>
-          </p:cNvPr>
-          <p:cNvSpPr txBox="1"/>
-          <p:nvPr/>
-        </p:nvSpPr>
-        <p:spPr>
-          <a:xfrm>
-            <a:off x="2579427" y="5745707"/>
-            <a:ext cx="1261884" cy="369332"/>
-          </a:xfrm>
-          <a:prstGeom prst="rect">
-            <a:avLst/>
-          </a:prstGeom>
-          <a:noFill/>
-        </p:spPr>
-        <p:txBody>
-          <a:bodyPr wrap="none" rtlCol="0">
-            <a:spAutoFit/>
-          </a:bodyPr>
-          <a:lstStyle/>
-          <a:p>
-            <a:r>
-              <a:rPr lang="en-US" dirty="0"/>
-              <a:t>&lt;</a:t>
-            </a:r>
-            <a:r>
-              <a:rPr lang="en-US" dirty="0" err="1"/>
-              <a:t>birds.txt</a:t>
-            </a:r>
-            <a:r>
-              <a:rPr lang="en-US" dirty="0"/>
-              <a:t>&gt;</a:t>
-            </a:r>
-          </a:p>
-        </p:txBody>
-      </p:sp>
-    </p:spTree>
-    <p:extLst>
-      <p:ext uri="{BB962C8B-B14F-4D97-AF65-F5344CB8AC3E}">
-        <p14:creationId xmlns:p14="http://schemas.microsoft.com/office/powerpoint/2010/main" val="480820790"/>
-      </p:ext>
-    </p:extLst>
-  </p:cSld>
-  <p:clrMapOvr>
-    <a:masterClrMapping/>
-  </p:clrMapOvr>
-</p:sld>
-</file>
-
-<file path=ppt/slides/slide96.xml><?xml version="1.0" encoding="utf-8"?>
-<p:sld xmlns:a="http://schemas.openxmlformats.org/drawingml/2006/main" xmlns:r="http://schemas.openxmlformats.org/officeDocument/2006/relationships" xmlns:p="http://schemas.openxmlformats.org/presentationml/2006/main">
-  <p:cSld>
-    <p:spTree>
-      <p:nvGrpSpPr>
-        <p:cNvPr id="1" name=""/>
-        <p:cNvGrpSpPr/>
-        <p:nvPr/>
-      </p:nvGrpSpPr>
-      <p:grpSpPr>
-        <a:xfrm>
-          <a:off x="0" y="0"/>
-          <a:ext cx="0" cy="0"/>
-          <a:chOff x="0" y="0"/>
-          <a:chExt cx="0" cy="0"/>
-        </a:xfrm>
-      </p:grpSpPr>
-      <p:sp>
-        <p:nvSpPr>
-          <p:cNvPr id="2" name="Text Placeholder 1">
-            <a:extLst>
-              <a:ext uri="{FF2B5EF4-FFF2-40B4-BE49-F238E27FC236}">
-                <a16:creationId xmlns:a16="http://schemas.microsoft.com/office/drawing/2014/main" id="{53CFE53B-E26A-324F-8F8F-E0EB26166427}"/>
-              </a:ext>
-            </a:extLst>
-          </p:cNvPr>
-          <p:cNvSpPr>
-            <a:spLocks noGrp="1"/>
-          </p:cNvSpPr>
-          <p:nvPr>
-            <p:ph type="body" sz="quarter" idx="10"/>
-          </p:nvPr>
-        </p:nvSpPr>
-        <p:spPr/>
-        <p:txBody>
-          <a:bodyPr/>
-          <a:lstStyle/>
-          <a:p>
-            <a:r>
-              <a:rPr lang="en-US" dirty="0"/>
-              <a:t>Let's print out the birds of which there are more than 5.</a:t>
-            </a:r>
-          </a:p>
-          <a:p>
-            <a:r>
-              <a:rPr lang="en-US" dirty="0"/>
-              <a:t>A dictionary is the natural way to keep track of the birds and their associated counts</a:t>
-            </a:r>
-          </a:p>
-          <a:p>
-            <a:r>
-              <a:rPr lang="en-US" dirty="0"/>
-              <a:t>Bird's name is the key, the count is the value</a:t>
-            </a:r>
-          </a:p>
-          <a:p>
-            <a:r>
-              <a:rPr lang="en-US" dirty="0"/>
-              <a:t>So here's a program that reads this file into a dictionary and then checks the counts</a:t>
-            </a:r>
-          </a:p>
-        </p:txBody>
-      </p:sp>
-    </p:spTree>
-    <p:extLst>
-      <p:ext uri="{BB962C8B-B14F-4D97-AF65-F5344CB8AC3E}">
-        <p14:creationId xmlns:p14="http://schemas.microsoft.com/office/powerpoint/2010/main" val="1991659872"/>
-      </p:ext>
-    </p:extLst>
-  </p:cSld>
-  <p:clrMapOvr>
-    <a:masterClrMapping/>
-  </p:clrMapOvr>
-</p:sld>
-</file>
-
-<file path=ppt/slides/slide97.xml><?xml version="1.0" encoding="utf-8"?>
-<p:sld xmlns:a="http://schemas.openxmlformats.org/drawingml/2006/main" xmlns:r="http://schemas.openxmlformats.org/officeDocument/2006/relationships" xmlns:p="http://schemas.openxmlformats.org/presentationml/2006/main">
-  <p:cSld>
-    <p:spTree>
-      <p:nvGrpSpPr>
-        <p:cNvPr id="1" name=""/>
-        <p:cNvGrpSpPr/>
-        <p:nvPr/>
-      </p:nvGrpSpPr>
-      <p:grpSpPr>
-        <a:xfrm>
-          <a:off x="0" y="0"/>
-          <a:ext cx="0" cy="0"/>
-          <a:chOff x="0" y="0"/>
-          <a:chExt cx="0" cy="0"/>
-        </a:xfrm>
-      </p:grpSpPr>
-      <p:sp>
-        <p:nvSpPr>
-          <p:cNvPr id="2" name="Text Placeholder 1">
-            <a:extLst>
-              <a:ext uri="{FF2B5EF4-FFF2-40B4-BE49-F238E27FC236}">
-                <a16:creationId xmlns:a16="http://schemas.microsoft.com/office/drawing/2014/main" id="{828E32FE-3274-4E4F-A2C5-5B965B5804F1}"/>
-              </a:ext>
-            </a:extLst>
-          </p:cNvPr>
-          <p:cNvSpPr>
-            <a:spLocks noGrp="1"/>
-          </p:cNvSpPr>
-          <p:nvPr>
-            <p:ph type="body" sz="quarter" idx="11"/>
-          </p:nvPr>
-        </p:nvSpPr>
-        <p:spPr/>
-        <p:txBody>
-          <a:bodyPr/>
-          <a:lstStyle/>
-          <a:p>
-            <a:endParaRPr lang="en-US"/>
-          </a:p>
-        </p:txBody>
-      </p:sp>
-      <p:sp>
-        <p:nvSpPr>
-          <p:cNvPr id="3" name="Text Placeholder 2">
-            <a:extLst>
-              <a:ext uri="{FF2B5EF4-FFF2-40B4-BE49-F238E27FC236}">
-                <a16:creationId xmlns:a16="http://schemas.microsoft.com/office/drawing/2014/main" id="{3CB9BC01-0ED5-3049-A807-F96C2DDB5207}"/>
-              </a:ext>
-            </a:extLst>
-          </p:cNvPr>
-          <p:cNvSpPr>
-            <a:spLocks noGrp="1"/>
-          </p:cNvSpPr>
-          <p:nvPr>
-            <p:ph type="body" sz="quarter" idx="12"/>
-          </p:nvPr>
-        </p:nvSpPr>
-        <p:spPr>
-          <a:xfrm>
-            <a:off x="949123" y="359330"/>
-            <a:ext cx="10955577" cy="5495479"/>
-          </a:xfrm>
-        </p:spPr>
-        <p:txBody>
-          <a:bodyPr/>
-          <a:lstStyle/>
-          <a:p>
-            <a:r>
-              <a:rPr lang="en-US" b="1" dirty="0">
-                <a:solidFill>
-                  <a:srgbClr val="000000"/>
-                </a:solidFill>
-                <a:latin typeface="Consolas" panose="020B0609020204030204" pitchFamily="49" charset="0"/>
-              </a:rPr>
-              <a:t>birds </a:t>
-            </a:r>
-            <a:r>
-              <a:rPr lang="en-US" b="1" dirty="0">
-                <a:solidFill>
-                  <a:srgbClr val="CE5C00"/>
-                </a:solidFill>
-                <a:latin typeface="Consolas" panose="020B0609020204030204" pitchFamily="49" charset="0"/>
-              </a:rPr>
-              <a:t>= </a:t>
-            </a:r>
-            <a:r>
-              <a:rPr lang="en-US" b="1" dirty="0">
-                <a:solidFill>
-                  <a:srgbClr val="000000"/>
-                </a:solidFill>
-                <a:latin typeface="Consolas" panose="020B0609020204030204" pitchFamily="49" charset="0"/>
-              </a:rPr>
-              <a:t>{}</a:t>
-            </a:r>
-          </a:p>
-          <a:p>
-            <a:endParaRPr lang="en-US" b="1" dirty="0">
-              <a:latin typeface="Consolas" panose="020B0609020204030204" pitchFamily="49" charset="0"/>
-            </a:endParaRPr>
-          </a:p>
-          <a:p>
-            <a:r>
-              <a:rPr lang="en-US" b="1" dirty="0">
-                <a:solidFill>
-                  <a:srgbClr val="000000"/>
-                </a:solidFill>
-                <a:latin typeface="Consolas" panose="020B0609020204030204" pitchFamily="49" charset="0"/>
-              </a:rPr>
-              <a:t>f </a:t>
-            </a:r>
-            <a:r>
-              <a:rPr lang="en-US" b="1" dirty="0">
-                <a:solidFill>
-                  <a:srgbClr val="CE5C00"/>
-                </a:solidFill>
-                <a:latin typeface="Consolas" panose="020B0609020204030204" pitchFamily="49" charset="0"/>
-              </a:rPr>
-              <a:t>= </a:t>
-            </a:r>
-            <a:r>
-              <a:rPr lang="en-US" b="1" dirty="0">
-                <a:solidFill>
-                  <a:srgbClr val="204A87"/>
-                </a:solidFill>
-                <a:latin typeface="Consolas" panose="020B0609020204030204" pitchFamily="49" charset="0"/>
-              </a:rPr>
-              <a:t>open</a:t>
-            </a:r>
-            <a:r>
-              <a:rPr lang="en-US" b="1" dirty="0">
-                <a:solidFill>
-                  <a:srgbClr val="000000"/>
-                </a:solidFill>
-                <a:latin typeface="Consolas" panose="020B0609020204030204" pitchFamily="49" charset="0"/>
-              </a:rPr>
-              <a:t>(</a:t>
-            </a:r>
-            <a:r>
-              <a:rPr lang="en-US" b="1" dirty="0">
-                <a:solidFill>
-                  <a:srgbClr val="4E9A06"/>
-                </a:solidFill>
-                <a:latin typeface="Consolas" panose="020B0609020204030204" pitchFamily="49" charset="0"/>
-              </a:rPr>
-              <a:t>'</a:t>
-            </a:r>
-            <a:r>
-              <a:rPr lang="en-US" b="1" dirty="0" err="1">
-                <a:solidFill>
-                  <a:srgbClr val="4E9A06"/>
-                </a:solidFill>
-                <a:latin typeface="Consolas" panose="020B0609020204030204" pitchFamily="49" charset="0"/>
-              </a:rPr>
-              <a:t>birds.txt</a:t>
-            </a:r>
-            <a:r>
-              <a:rPr lang="en-US" b="1" dirty="0">
-                <a:solidFill>
-                  <a:srgbClr val="4E9A06"/>
-                </a:solidFill>
-                <a:latin typeface="Consolas" panose="020B0609020204030204" pitchFamily="49" charset="0"/>
-              </a:rPr>
-              <a:t>'</a:t>
-            </a:r>
-            <a:r>
-              <a:rPr lang="en-US" b="1" dirty="0">
-                <a:solidFill>
-                  <a:srgbClr val="000000"/>
-                </a:solidFill>
-                <a:latin typeface="Consolas" panose="020B0609020204030204" pitchFamily="49" charset="0"/>
-              </a:rPr>
-              <a:t>)</a:t>
-            </a:r>
-          </a:p>
-          <a:p>
-            <a:r>
-              <a:rPr lang="en-US" b="1" dirty="0">
-                <a:solidFill>
-                  <a:srgbClr val="204A87"/>
-                </a:solidFill>
-                <a:latin typeface="Consolas" panose="020B0609020204030204" pitchFamily="49" charset="0"/>
-              </a:rPr>
-              <a:t>for </a:t>
-            </a:r>
-            <a:r>
-              <a:rPr lang="en-US" b="1" dirty="0">
-                <a:solidFill>
-                  <a:srgbClr val="000000"/>
-                </a:solidFill>
-                <a:latin typeface="Consolas" panose="020B0609020204030204" pitchFamily="49" charset="0"/>
-              </a:rPr>
-              <a:t>line </a:t>
-            </a:r>
-            <a:r>
-              <a:rPr lang="en-US" b="1" dirty="0">
-                <a:solidFill>
-                  <a:srgbClr val="204A87"/>
-                </a:solidFill>
-                <a:latin typeface="Consolas" panose="020B0609020204030204" pitchFamily="49" charset="0"/>
-              </a:rPr>
-              <a:t>in </a:t>
-            </a:r>
-            <a:r>
-              <a:rPr lang="en-US" b="1" dirty="0">
-                <a:solidFill>
-                  <a:srgbClr val="000000"/>
-                </a:solidFill>
-                <a:latin typeface="Consolas" panose="020B0609020204030204" pitchFamily="49" charset="0"/>
-              </a:rPr>
-              <a:t>f:</a:t>
-            </a:r>
-          </a:p>
-          <a:p>
-            <a:r>
-              <a:rPr lang="en-US" b="1" dirty="0">
-                <a:latin typeface="Consolas" panose="020B0609020204030204" pitchFamily="49" charset="0"/>
-              </a:rPr>
-              <a:t>    </a:t>
-            </a:r>
-            <a:r>
-              <a:rPr lang="en-US" b="1" dirty="0">
-                <a:solidFill>
-                  <a:srgbClr val="000000"/>
-                </a:solidFill>
-                <a:latin typeface="Consolas" panose="020B0609020204030204" pitchFamily="49" charset="0"/>
-              </a:rPr>
-              <a:t>fields </a:t>
-            </a:r>
-            <a:r>
-              <a:rPr lang="en-US" b="1" dirty="0">
-                <a:solidFill>
-                  <a:srgbClr val="CE5C00"/>
-                </a:solidFill>
-                <a:latin typeface="Consolas" panose="020B0609020204030204" pitchFamily="49" charset="0"/>
-              </a:rPr>
-              <a:t>= </a:t>
-            </a:r>
-            <a:r>
-              <a:rPr lang="en-US" b="1" dirty="0" err="1">
-                <a:solidFill>
-                  <a:srgbClr val="000000"/>
-                </a:solidFill>
-                <a:latin typeface="Consolas" panose="020B0609020204030204" pitchFamily="49" charset="0"/>
-              </a:rPr>
-              <a:t>line</a:t>
-            </a:r>
-            <a:r>
-              <a:rPr lang="en-US" b="1" dirty="0" err="1">
-                <a:solidFill>
-                  <a:srgbClr val="CE5C00"/>
-                </a:solidFill>
-                <a:latin typeface="Consolas" panose="020B0609020204030204" pitchFamily="49" charset="0"/>
-              </a:rPr>
-              <a:t>.</a:t>
-            </a:r>
-            <a:r>
-              <a:rPr lang="en-US" b="1" dirty="0" err="1">
-                <a:solidFill>
-                  <a:srgbClr val="000000"/>
-                </a:solidFill>
-                <a:latin typeface="Consolas" panose="020B0609020204030204" pitchFamily="49" charset="0"/>
-              </a:rPr>
-              <a:t>split</a:t>
-            </a:r>
-            <a:r>
-              <a:rPr lang="en-US" b="1" dirty="0">
-                <a:solidFill>
-                  <a:srgbClr val="000000"/>
-                </a:solidFill>
-                <a:latin typeface="Consolas" panose="020B0609020204030204" pitchFamily="49" charset="0"/>
-              </a:rPr>
-              <a:t>()</a:t>
-            </a:r>
-          </a:p>
-          <a:p>
-            <a:r>
-              <a:rPr lang="en-US" b="1" dirty="0">
-                <a:latin typeface="Consolas" panose="020B0609020204030204" pitchFamily="49" charset="0"/>
-              </a:rPr>
-              <a:t>    </a:t>
-            </a:r>
-            <a:r>
-              <a:rPr lang="en-US" b="1" dirty="0" err="1">
-                <a:solidFill>
-                  <a:srgbClr val="000000"/>
-                </a:solidFill>
-                <a:latin typeface="Consolas" panose="020B0609020204030204" pitchFamily="49" charset="0"/>
-              </a:rPr>
-              <a:t>bird_name</a:t>
-            </a:r>
-            <a:r>
-              <a:rPr lang="en-US" b="1" dirty="0">
-                <a:solidFill>
-                  <a:srgbClr val="000000"/>
-                </a:solidFill>
-                <a:latin typeface="Consolas" panose="020B0609020204030204" pitchFamily="49" charset="0"/>
-              </a:rPr>
-              <a:t> </a:t>
-            </a:r>
-            <a:r>
-              <a:rPr lang="en-US" b="1" dirty="0">
-                <a:solidFill>
-                  <a:srgbClr val="CE5C00"/>
-                </a:solidFill>
-                <a:latin typeface="Consolas" panose="020B0609020204030204" pitchFamily="49" charset="0"/>
-              </a:rPr>
-              <a:t>= </a:t>
-            </a:r>
-            <a:r>
-              <a:rPr lang="en-US" b="1" dirty="0">
-                <a:solidFill>
-                  <a:srgbClr val="000000"/>
-                </a:solidFill>
-                <a:latin typeface="Consolas" panose="020B0609020204030204" pitchFamily="49" charset="0"/>
-              </a:rPr>
-              <a:t>fields[</a:t>
-            </a:r>
-            <a:r>
-              <a:rPr lang="en-US" b="1" dirty="0">
-                <a:solidFill>
-                  <a:srgbClr val="0000CF"/>
-                </a:solidFill>
-                <a:latin typeface="Consolas" panose="020B0609020204030204" pitchFamily="49" charset="0"/>
-              </a:rPr>
-              <a:t>0</a:t>
-            </a:r>
-            <a:r>
-              <a:rPr lang="en-US" b="1" dirty="0">
-                <a:solidFill>
-                  <a:srgbClr val="000000"/>
-                </a:solidFill>
-                <a:latin typeface="Consolas" panose="020B0609020204030204" pitchFamily="49" charset="0"/>
-              </a:rPr>
-              <a:t>]</a:t>
-            </a:r>
-          </a:p>
-          <a:p>
-            <a:r>
-              <a:rPr lang="en-US" b="1" dirty="0">
-                <a:latin typeface="Consolas" panose="020B0609020204030204" pitchFamily="49" charset="0"/>
-              </a:rPr>
-              <a:t>    </a:t>
-            </a:r>
-            <a:r>
-              <a:rPr lang="en-US" b="1" dirty="0" err="1">
-                <a:solidFill>
-                  <a:srgbClr val="000000"/>
-                </a:solidFill>
-                <a:latin typeface="Consolas" panose="020B0609020204030204" pitchFamily="49" charset="0"/>
-              </a:rPr>
-              <a:t>bird_count</a:t>
-            </a:r>
-            <a:r>
-              <a:rPr lang="en-US" b="1" dirty="0">
-                <a:solidFill>
-                  <a:srgbClr val="000000"/>
-                </a:solidFill>
-                <a:latin typeface="Consolas" panose="020B0609020204030204" pitchFamily="49" charset="0"/>
-              </a:rPr>
-              <a:t> </a:t>
-            </a:r>
-            <a:r>
-              <a:rPr lang="en-US" b="1" dirty="0">
-                <a:solidFill>
-                  <a:srgbClr val="CE5C00"/>
-                </a:solidFill>
-                <a:latin typeface="Consolas" panose="020B0609020204030204" pitchFamily="49" charset="0"/>
-              </a:rPr>
-              <a:t>= </a:t>
-            </a:r>
-            <a:r>
-              <a:rPr lang="en-US" b="1" dirty="0" err="1">
-                <a:solidFill>
-                  <a:srgbClr val="204A87"/>
-                </a:solidFill>
-                <a:latin typeface="Consolas" panose="020B0609020204030204" pitchFamily="49" charset="0"/>
-              </a:rPr>
-              <a:t>int</a:t>
-            </a:r>
-            <a:r>
-              <a:rPr lang="en-US" b="1" dirty="0">
-                <a:solidFill>
-                  <a:srgbClr val="000000"/>
-                </a:solidFill>
-                <a:latin typeface="Consolas" panose="020B0609020204030204" pitchFamily="49" charset="0"/>
-              </a:rPr>
-              <a:t>(fields[</a:t>
-            </a:r>
-            <a:r>
-              <a:rPr lang="en-US" b="1" dirty="0">
-                <a:solidFill>
-                  <a:srgbClr val="0000CF"/>
-                </a:solidFill>
-                <a:latin typeface="Consolas" panose="020B0609020204030204" pitchFamily="49" charset="0"/>
-              </a:rPr>
-              <a:t>1</a:t>
-            </a:r>
-            <a:r>
-              <a:rPr lang="en-US" b="1" dirty="0">
-                <a:solidFill>
-                  <a:srgbClr val="000000"/>
-                </a:solidFill>
-                <a:latin typeface="Consolas" panose="020B0609020204030204" pitchFamily="49" charset="0"/>
-              </a:rPr>
-              <a:t>])</a:t>
-            </a:r>
-          </a:p>
-          <a:p>
-            <a:r>
-              <a:rPr lang="en-US" b="1" dirty="0">
-                <a:latin typeface="Consolas" panose="020B0609020204030204" pitchFamily="49" charset="0"/>
-              </a:rPr>
-              <a:t>    </a:t>
-            </a:r>
-            <a:r>
-              <a:rPr lang="en-US" b="1" dirty="0">
-                <a:solidFill>
-                  <a:srgbClr val="000000"/>
-                </a:solidFill>
-                <a:latin typeface="Consolas" panose="020B0609020204030204" pitchFamily="49" charset="0"/>
-              </a:rPr>
-              <a:t>birds[</a:t>
-            </a:r>
-            <a:r>
-              <a:rPr lang="en-US" b="1" dirty="0" err="1">
-                <a:solidFill>
-                  <a:srgbClr val="000000"/>
-                </a:solidFill>
-                <a:latin typeface="Consolas" panose="020B0609020204030204" pitchFamily="49" charset="0"/>
-              </a:rPr>
-              <a:t>bird_name</a:t>
-            </a:r>
-            <a:r>
-              <a:rPr lang="en-US" b="1" dirty="0">
-                <a:solidFill>
-                  <a:srgbClr val="000000"/>
-                </a:solidFill>
-                <a:latin typeface="Consolas" panose="020B0609020204030204" pitchFamily="49" charset="0"/>
-              </a:rPr>
-              <a:t>] </a:t>
-            </a:r>
-            <a:r>
-              <a:rPr lang="en-US" b="1" dirty="0">
-                <a:solidFill>
-                  <a:srgbClr val="CE5C00"/>
-                </a:solidFill>
-                <a:latin typeface="Consolas" panose="020B0609020204030204" pitchFamily="49" charset="0"/>
-              </a:rPr>
-              <a:t>= </a:t>
-            </a:r>
-            <a:r>
-              <a:rPr lang="en-US" b="1" dirty="0" err="1">
-                <a:solidFill>
-                  <a:srgbClr val="000000"/>
-                </a:solidFill>
-                <a:latin typeface="Consolas" panose="020B0609020204030204" pitchFamily="49" charset="0"/>
-              </a:rPr>
-              <a:t>bird_count</a:t>
-            </a:r>
-            <a:endParaRPr lang="en-US" b="1" dirty="0">
-              <a:solidFill>
-                <a:srgbClr val="000000"/>
-              </a:solidFill>
-              <a:latin typeface="Consolas" panose="020B0609020204030204" pitchFamily="49" charset="0"/>
-            </a:endParaRPr>
-          </a:p>
-          <a:p>
-            <a:r>
-              <a:rPr lang="en-US" b="1" dirty="0" err="1">
-                <a:solidFill>
-                  <a:srgbClr val="000000"/>
-                </a:solidFill>
-                <a:latin typeface="Consolas" panose="020B0609020204030204" pitchFamily="49" charset="0"/>
-              </a:rPr>
-              <a:t>f</a:t>
-            </a:r>
-            <a:r>
-              <a:rPr lang="en-US" b="1" dirty="0" err="1">
-                <a:solidFill>
-                  <a:srgbClr val="CE5C00"/>
-                </a:solidFill>
-                <a:latin typeface="Consolas" panose="020B0609020204030204" pitchFamily="49" charset="0"/>
-              </a:rPr>
-              <a:t>.</a:t>
-            </a:r>
-            <a:r>
-              <a:rPr lang="en-US" b="1" dirty="0" err="1">
-                <a:solidFill>
-                  <a:srgbClr val="000000"/>
-                </a:solidFill>
-                <a:latin typeface="Consolas" panose="020B0609020204030204" pitchFamily="49" charset="0"/>
-              </a:rPr>
-              <a:t>close</a:t>
-            </a:r>
-            <a:r>
-              <a:rPr lang="en-US" b="1" dirty="0">
-                <a:solidFill>
-                  <a:srgbClr val="000000"/>
-                </a:solidFill>
-                <a:latin typeface="Consolas" panose="020B0609020204030204" pitchFamily="49" charset="0"/>
-              </a:rPr>
-              <a:t>()</a:t>
-            </a:r>
-          </a:p>
-          <a:p>
-            <a:endParaRPr lang="en-US" b="1" dirty="0">
-              <a:latin typeface="Consolas" panose="020B0609020204030204" pitchFamily="49" charset="0"/>
-            </a:endParaRPr>
-          </a:p>
-          <a:p>
-            <a:r>
-              <a:rPr lang="en-US" b="1" dirty="0">
-                <a:solidFill>
-                  <a:srgbClr val="204A87"/>
-                </a:solidFill>
-                <a:latin typeface="Consolas" panose="020B0609020204030204" pitchFamily="49" charset="0"/>
-              </a:rPr>
-              <a:t>for </a:t>
-            </a:r>
-            <a:r>
-              <a:rPr lang="en-US" b="1" dirty="0" err="1">
-                <a:solidFill>
-                  <a:srgbClr val="000000"/>
-                </a:solidFill>
-                <a:latin typeface="Consolas" panose="020B0609020204030204" pitchFamily="49" charset="0"/>
-              </a:rPr>
-              <a:t>bird_name</a:t>
-            </a:r>
-            <a:r>
-              <a:rPr lang="en-US" b="1" dirty="0">
-                <a:solidFill>
-                  <a:srgbClr val="000000"/>
-                </a:solidFill>
-                <a:latin typeface="Consolas" panose="020B0609020204030204" pitchFamily="49" charset="0"/>
-              </a:rPr>
-              <a:t> </a:t>
-            </a:r>
-            <a:r>
-              <a:rPr lang="en-US" b="1" dirty="0">
-                <a:solidFill>
-                  <a:srgbClr val="204A87"/>
-                </a:solidFill>
-                <a:latin typeface="Consolas" panose="020B0609020204030204" pitchFamily="49" charset="0"/>
-              </a:rPr>
-              <a:t>in </a:t>
-            </a:r>
-            <a:r>
-              <a:rPr lang="en-US" b="1" dirty="0">
-                <a:solidFill>
-                  <a:srgbClr val="000000"/>
-                </a:solidFill>
-                <a:latin typeface="Consolas" panose="020B0609020204030204" pitchFamily="49" charset="0"/>
-              </a:rPr>
-              <a:t>birds:</a:t>
-            </a:r>
-          </a:p>
-          <a:p>
-            <a:r>
-              <a:rPr lang="en-US" b="1" dirty="0">
-                <a:latin typeface="Consolas" panose="020B0609020204030204" pitchFamily="49" charset="0"/>
-              </a:rPr>
-              <a:t>    </a:t>
-            </a:r>
-            <a:r>
-              <a:rPr lang="en-US" b="1" dirty="0">
-                <a:solidFill>
-                  <a:srgbClr val="204A87"/>
-                </a:solidFill>
-                <a:latin typeface="Consolas" panose="020B0609020204030204" pitchFamily="49" charset="0"/>
-              </a:rPr>
-              <a:t>if </a:t>
-            </a:r>
-            <a:r>
-              <a:rPr lang="en-US" b="1" dirty="0">
-                <a:solidFill>
-                  <a:srgbClr val="000000"/>
-                </a:solidFill>
-                <a:latin typeface="Consolas" panose="020B0609020204030204" pitchFamily="49" charset="0"/>
-              </a:rPr>
-              <a:t>birds[</a:t>
-            </a:r>
-            <a:r>
-              <a:rPr lang="en-US" b="1" dirty="0" err="1">
-                <a:solidFill>
-                  <a:srgbClr val="000000"/>
-                </a:solidFill>
-                <a:latin typeface="Consolas" panose="020B0609020204030204" pitchFamily="49" charset="0"/>
-              </a:rPr>
-              <a:t>bird_name</a:t>
-            </a:r>
-            <a:r>
-              <a:rPr lang="en-US" b="1" dirty="0">
-                <a:solidFill>
-                  <a:srgbClr val="000000"/>
-                </a:solidFill>
-                <a:latin typeface="Consolas" panose="020B0609020204030204" pitchFamily="49" charset="0"/>
-              </a:rPr>
-              <a:t>] </a:t>
-            </a:r>
-            <a:r>
-              <a:rPr lang="en-US" b="1" dirty="0">
-                <a:solidFill>
-                  <a:srgbClr val="CE5C00"/>
-                </a:solidFill>
-                <a:latin typeface="Consolas" panose="020B0609020204030204" pitchFamily="49" charset="0"/>
-              </a:rPr>
-              <a:t>&gt; </a:t>
-            </a:r>
-            <a:r>
-              <a:rPr lang="en-US" b="1" dirty="0">
-                <a:solidFill>
-                  <a:srgbClr val="0000CF"/>
-                </a:solidFill>
-                <a:latin typeface="Consolas" panose="020B0609020204030204" pitchFamily="49" charset="0"/>
-              </a:rPr>
-              <a:t>5</a:t>
-            </a:r>
-            <a:r>
-              <a:rPr lang="en-US" b="1" dirty="0">
-                <a:solidFill>
-                  <a:srgbClr val="000000"/>
-                </a:solidFill>
-                <a:latin typeface="Consolas" panose="020B0609020204030204" pitchFamily="49" charset="0"/>
-              </a:rPr>
-              <a:t>:</a:t>
-            </a:r>
-          </a:p>
-          <a:p>
-            <a:r>
-              <a:rPr lang="en-US" b="1" dirty="0">
-                <a:latin typeface="Consolas" panose="020B0609020204030204" pitchFamily="49" charset="0"/>
-              </a:rPr>
-              <a:t>        </a:t>
-            </a:r>
-            <a:r>
-              <a:rPr lang="en-US" b="1" dirty="0">
-                <a:solidFill>
-                  <a:srgbClr val="204A87"/>
-                </a:solidFill>
-                <a:latin typeface="Consolas" panose="020B0609020204030204" pitchFamily="49" charset="0"/>
-              </a:rPr>
-              <a:t>print</a:t>
-            </a:r>
-            <a:r>
-              <a:rPr lang="en-US" b="1" dirty="0">
-                <a:solidFill>
-                  <a:srgbClr val="000000"/>
-                </a:solidFill>
-                <a:latin typeface="Consolas" panose="020B0609020204030204" pitchFamily="49" charset="0"/>
-              </a:rPr>
-              <a:t>(</a:t>
-            </a:r>
-            <a:r>
-              <a:rPr lang="en-US" b="1" dirty="0">
-                <a:solidFill>
-                  <a:srgbClr val="4E9A06"/>
-                </a:solidFill>
-                <a:latin typeface="Consolas" panose="020B0609020204030204" pitchFamily="49" charset="0"/>
-              </a:rPr>
-              <a:t>'There are more than 5 ' </a:t>
-            </a:r>
-            <a:r>
-              <a:rPr lang="en-US" b="1" dirty="0">
-                <a:solidFill>
-                  <a:srgbClr val="CE5C00"/>
-                </a:solidFill>
-                <a:latin typeface="Consolas" panose="020B0609020204030204" pitchFamily="49" charset="0"/>
-              </a:rPr>
-              <a:t>+ </a:t>
-            </a:r>
-            <a:r>
-              <a:rPr lang="en-US" b="1" dirty="0" err="1">
-                <a:solidFill>
-                  <a:srgbClr val="000000"/>
-                </a:solidFill>
-                <a:latin typeface="Consolas" panose="020B0609020204030204" pitchFamily="49" charset="0"/>
-              </a:rPr>
-              <a:t>bird_name</a:t>
-            </a:r>
-            <a:r>
-              <a:rPr lang="en-US" b="1" dirty="0">
-                <a:solidFill>
-                  <a:srgbClr val="000000"/>
-                </a:solidFill>
-                <a:latin typeface="Consolas" panose="020B0609020204030204" pitchFamily="49" charset="0"/>
-              </a:rPr>
-              <a:t> </a:t>
-            </a:r>
-            <a:r>
-              <a:rPr lang="en-US" b="1" dirty="0">
-                <a:solidFill>
-                  <a:srgbClr val="CE5C00"/>
-                </a:solidFill>
-                <a:latin typeface="Consolas" panose="020B0609020204030204" pitchFamily="49" charset="0"/>
-              </a:rPr>
-              <a:t>+ </a:t>
-            </a:r>
-            <a:r>
-              <a:rPr lang="en-US" b="1" dirty="0">
-                <a:solidFill>
-                  <a:srgbClr val="4E9A06"/>
-                </a:solidFill>
-                <a:latin typeface="Consolas" panose="020B0609020204030204" pitchFamily="49" charset="0"/>
-              </a:rPr>
-              <a:t>'s'</a:t>
-            </a:r>
-            <a:r>
-              <a:rPr lang="en-US" b="1" dirty="0">
-                <a:solidFill>
-                  <a:srgbClr val="000000"/>
-                </a:solidFill>
-                <a:latin typeface="Consolas" panose="020B0609020204030204" pitchFamily="49" charset="0"/>
-              </a:rPr>
-              <a:t>)</a:t>
-            </a:r>
-          </a:p>
-        </p:txBody>
-      </p:sp>
-      <p:sp>
-        <p:nvSpPr>
-          <p:cNvPr id="4" name="TextBox 3">
-            <a:extLst>
-              <a:ext uri="{FF2B5EF4-FFF2-40B4-BE49-F238E27FC236}">
-                <a16:creationId xmlns:a16="http://schemas.microsoft.com/office/drawing/2014/main" id="{123948E2-E3C4-624C-B0DD-F8DD7A667B8B}"/>
-              </a:ext>
-            </a:extLst>
-          </p:cNvPr>
-          <p:cNvSpPr txBox="1"/>
-          <p:nvPr/>
-        </p:nvSpPr>
-        <p:spPr>
-          <a:xfrm>
-            <a:off x="2906973" y="6277970"/>
-            <a:ext cx="1390124" cy="369332"/>
-          </a:xfrm>
-          <a:prstGeom prst="rect">
-            <a:avLst/>
-          </a:prstGeom>
-          <a:noFill/>
-        </p:spPr>
-        <p:txBody>
-          <a:bodyPr wrap="none" rtlCol="0">
-            <a:spAutoFit/>
-          </a:bodyPr>
-          <a:lstStyle/>
-          <a:p>
-            <a:r>
-              <a:rPr lang="en-US" dirty="0"/>
-              <a:t>&lt;birds1.py&gt;</a:t>
-            </a:r>
-          </a:p>
-        </p:txBody>
-      </p:sp>
-    </p:spTree>
-    <p:extLst>
-      <p:ext uri="{BB962C8B-B14F-4D97-AF65-F5344CB8AC3E}">
-        <p14:creationId xmlns:p14="http://schemas.microsoft.com/office/powerpoint/2010/main" val="1596142058"/>
-      </p:ext>
-    </p:extLst>
-  </p:cSld>
-  <p:clrMapOvr>
-    <a:masterClrMapping/>
-  </p:clrMapOvr>
-</p:sld>
-</file>
-
-<file path=ppt/slides/slide98.xml><?xml version="1.0" encoding="utf-8"?>
-<p:sld xmlns:a="http://schemas.openxmlformats.org/drawingml/2006/main" xmlns:r="http://schemas.openxmlformats.org/officeDocument/2006/relationships" xmlns:p="http://schemas.openxmlformats.org/presentationml/2006/main">
-  <p:cSld>
-    <p:spTree>
-      <p:nvGrpSpPr>
-        <p:cNvPr id="1" name=""/>
-        <p:cNvGrpSpPr/>
-        <p:nvPr/>
-      </p:nvGrpSpPr>
-      <p:grpSpPr>
-        <a:xfrm>
-          <a:off x="0" y="0"/>
-          <a:ext cx="0" cy="0"/>
-          <a:chOff x="0" y="0"/>
-          <a:chExt cx="0" cy="0"/>
-        </a:xfrm>
-      </p:grpSpPr>
-      <p:sp>
-        <p:nvSpPr>
-          <p:cNvPr id="2" name="Text Placeholder 1">
-            <a:extLst>
-              <a:ext uri="{FF2B5EF4-FFF2-40B4-BE49-F238E27FC236}">
-                <a16:creationId xmlns:a16="http://schemas.microsoft.com/office/drawing/2014/main" id="{633DC33F-4ED5-4C48-AE5B-48DB1CACF393}"/>
-              </a:ext>
-            </a:extLst>
-          </p:cNvPr>
-          <p:cNvSpPr>
-            <a:spLocks noGrp="1"/>
-          </p:cNvSpPr>
-          <p:nvPr>
-            <p:ph type="body" sz="quarter" idx="10"/>
-          </p:nvPr>
-        </p:nvSpPr>
-        <p:spPr/>
-        <p:txBody>
-          <a:bodyPr>
-            <a:normAutofit fontScale="92500"/>
-          </a:bodyPr>
-          <a:lstStyle/>
-          <a:p>
-            <a:r>
-              <a:rPr lang="en-US" dirty="0"/>
-              <a:t>First, we create an empty dictionary</a:t>
-            </a:r>
-          </a:p>
-          <a:p>
-            <a:r>
-              <a:rPr lang="en-US" dirty="0"/>
-              <a:t>Then, we open the </a:t>
-            </a:r>
-            <a:r>
-              <a:rPr lang="en-US" dirty="0" err="1"/>
-              <a:t>birds.txt</a:t>
-            </a:r>
-            <a:r>
-              <a:rPr lang="en-US" dirty="0"/>
-              <a:t> file and for-loop over the lines (this part is totally standard by now)</a:t>
-            </a:r>
-          </a:p>
-          <a:p>
-            <a:r>
-              <a:rPr lang="en-US" dirty="0"/>
-              <a:t>Each line is a name, a space, and then the count. This is a job for split!</a:t>
-            </a:r>
-          </a:p>
-          <a:p>
-            <a:r>
-              <a:rPr lang="en-US" dirty="0"/>
-              <a:t>The first </a:t>
-            </a:r>
-            <a:r>
-              <a:rPr lang="en-US" i="1" dirty="0"/>
-              <a:t>field</a:t>
-            </a:r>
-            <a:r>
-              <a:rPr lang="en-US" dirty="0"/>
-              <a:t> is the name, put that in </a:t>
-            </a:r>
-            <a:r>
-              <a:rPr lang="en-US" dirty="0" err="1"/>
-              <a:t>bird_name</a:t>
-            </a:r>
-            <a:endParaRPr lang="en-US" dirty="0"/>
-          </a:p>
-          <a:p>
-            <a:r>
-              <a:rPr lang="en-US" dirty="0"/>
-              <a:t>The second field is the count, put that in </a:t>
-            </a:r>
-            <a:r>
-              <a:rPr lang="en-US" dirty="0" err="1"/>
-              <a:t>bird_count</a:t>
-            </a:r>
-            <a:r>
-              <a:rPr lang="en-US" dirty="0"/>
-              <a:t>, but convert it to an integer first</a:t>
-            </a:r>
-          </a:p>
-          <a:p>
-            <a:r>
-              <a:rPr lang="en-US" dirty="0"/>
-              <a:t>Then put that key/value pair into the birds dictionary</a:t>
-            </a:r>
-          </a:p>
-          <a:p>
-            <a:endParaRPr lang="en-US" dirty="0"/>
-          </a:p>
-        </p:txBody>
-      </p:sp>
-    </p:spTree>
-    <p:extLst>
-      <p:ext uri="{BB962C8B-B14F-4D97-AF65-F5344CB8AC3E}">
-        <p14:creationId xmlns:p14="http://schemas.microsoft.com/office/powerpoint/2010/main" val="959714780"/>
-      </p:ext>
-    </p:extLst>
-  </p:cSld>
-  <p:clrMapOvr>
-    <a:masterClrMapping/>
-  </p:clrMapOvr>
-</p:sld>
-</file>
-
-<file path=ppt/slides/slide99.xml><?xml version="1.0" encoding="utf-8"?>
-<p:sld xmlns:a="http://schemas.openxmlformats.org/drawingml/2006/main" xmlns:r="http://schemas.openxmlformats.org/officeDocument/2006/relationships" xmlns:p="http://schemas.openxmlformats.org/presentationml/2006/main">
-  <p:cSld>
-    <p:spTree>
-      <p:nvGrpSpPr>
-        <p:cNvPr id="1" name=""/>
-        <p:cNvGrpSpPr/>
-        <p:nvPr/>
-      </p:nvGrpSpPr>
-      <p:grpSpPr>
-        <a:xfrm>
-          <a:off x="0" y="0"/>
-          <a:ext cx="0" cy="0"/>
-          <a:chOff x="0" y="0"/>
-          <a:chExt cx="0" cy="0"/>
-        </a:xfrm>
-      </p:grpSpPr>
-      <p:sp>
-        <p:nvSpPr>
-          <p:cNvPr id="2" name="Text Placeholder 1">
-            <a:extLst>
-              <a:ext uri="{FF2B5EF4-FFF2-40B4-BE49-F238E27FC236}">
-                <a16:creationId xmlns:a16="http://schemas.microsoft.com/office/drawing/2014/main" id="{2F1BF249-A0B5-E543-95F9-61E268537E16}"/>
-              </a:ext>
-            </a:extLst>
-          </p:cNvPr>
-          <p:cNvSpPr>
-            <a:spLocks noGrp="1"/>
-          </p:cNvSpPr>
-          <p:nvPr>
-            <p:ph type="body" sz="quarter" idx="10"/>
-          </p:nvPr>
-        </p:nvSpPr>
-        <p:spPr/>
-        <p:txBody>
-          <a:bodyPr/>
-          <a:lstStyle/>
-          <a:p>
-            <a:r>
-              <a:rPr lang="en-US" dirty="0"/>
-              <a:t>Once we have the dictionary, it's straightforward to loop over it and find the birds with &gt; 5</a:t>
-            </a:r>
-          </a:p>
-        </p:txBody>
-      </p:sp>
-    </p:spTree>
-    <p:extLst>
-      <p:ext uri="{BB962C8B-B14F-4D97-AF65-F5344CB8AC3E}">
-        <p14:creationId xmlns:p14="http://schemas.microsoft.com/office/powerpoint/2010/main" val="2776929422"/>
       </p:ext>
     </p:extLst>
   </p:cSld>

</xml_diff>